<commit_message>
add scanner flow diagram
</commit_message>
<xml_diff>
--- a/presentation/food-scanner.pptx
+++ b/presentation/food-scanner.pptx
@@ -5,7 +5,7 @@
     <p:sldMasterId id="2147483659" r:id="rId1"/>
   </p:sldMasterIdLst>
   <p:notesMasterIdLst>
-    <p:notesMasterId r:id="rId11"/>
+    <p:notesMasterId r:id="rId12"/>
   </p:notesMasterIdLst>
   <p:sldIdLst>
     <p:sldId id="256" r:id="rId2"/>
@@ -15,25 +15,26 @@
     <p:sldId id="266" r:id="rId6"/>
     <p:sldId id="259" r:id="rId7"/>
     <p:sldId id="261" r:id="rId8"/>
-    <p:sldId id="262" r:id="rId9"/>
-    <p:sldId id="263" r:id="rId10"/>
+    <p:sldId id="268" r:id="rId9"/>
+    <p:sldId id="262" r:id="rId10"/>
+    <p:sldId id="263" r:id="rId11"/>
   </p:sldIdLst>
   <p:sldSz cx="9144000" cy="5143500" type="screen16x9"/>
   <p:notesSz cx="6858000" cy="9144000"/>
   <p:embeddedFontLst>
     <p:embeddedFont>
-      <p:font typeface="Lato" panose="020B0604020202020204" charset="0"/>
-      <p:regular r:id="rId12"/>
-      <p:bold r:id="rId13"/>
-      <p:italic r:id="rId14"/>
-      <p:boldItalic r:id="rId15"/>
+      <p:font typeface="Lato" panose="020F0502020204030203" pitchFamily="34" charset="77"/>
+      <p:regular r:id="rId13"/>
+      <p:bold r:id="rId14"/>
+      <p:italic r:id="rId15"/>
+      <p:boldItalic r:id="rId16"/>
     </p:embeddedFont>
     <p:embeddedFont>
-      <p:font typeface="Montserrat" panose="020B0604020202020204" charset="0"/>
-      <p:regular r:id="rId16"/>
-      <p:bold r:id="rId17"/>
-      <p:italic r:id="rId18"/>
-      <p:boldItalic r:id="rId19"/>
+      <p:font typeface="Montserrat" pitchFamily="2" charset="77"/>
+      <p:regular r:id="rId17"/>
+      <p:bold r:id="rId18"/>
+      <p:italic r:id="rId19"/>
+      <p:boldItalic r:id="rId20"/>
     </p:embeddedFont>
   </p:embeddedFontLst>
   <p:defaultTextStyle>
@@ -268,12 +269,12 @@
   <p:extLst>
     <p:ext uri="{EFAFB233-063F-42B5-8137-9DF3F51BA10A}">
       <p15:sldGuideLst xmlns:p15="http://schemas.microsoft.com/office/powerpoint/2012/main">
-        <p15:guide id="1" orient="horz" pos="1620">
+        <p15:guide id="1" orient="horz" pos="1620" userDrawn="1">
           <p15:clr>
             <a:srgbClr val="A4A3A4"/>
           </p15:clr>
         </p15:guide>
-        <p15:guide id="2" pos="2880">
+        <p15:guide id="2" pos="2880" userDrawn="1">
           <p15:clr>
             <a:srgbClr val="A4A3A4"/>
           </p15:clr>
@@ -318,8 +319,8 @@
         </p:nvSpPr>
         <p:spPr>
           <a:xfrm>
-            <a:off x="381300" y="685800"/>
-            <a:ext cx="6096075" cy="3429000"/>
+            <a:off x="381000" y="685800"/>
+            <a:ext cx="6096000" cy="3429000"/>
           </a:xfrm>
           <a:custGeom>
             <a:avLst/>
@@ -754,8 +755,8 @@
         </p:nvSpPr>
         <p:spPr>
           <a:xfrm>
-            <a:off x="381300" y="685800"/>
-            <a:ext cx="6096075" cy="3429000"/>
+            <a:off x="381000" y="685800"/>
+            <a:ext cx="6096000" cy="3429000"/>
           </a:xfrm>
           <a:custGeom>
             <a:avLst/>
@@ -1701,7 +1702,7 @@
         </p:nvSpPr>
         <p:spPr>
           <a:xfrm rot="5400000">
-            <a:off x="7500300" y="505"/>
+            <a:off x="7500301" y="505"/>
             <a:ext cx="1643700" cy="1643700"/>
           </a:xfrm>
           <a:prstGeom prst="diagStripe">
@@ -1733,7 +1734,7 @@
               </a:spcAft>
               <a:buNone/>
             </a:pPr>
-            <a:endParaRPr/>
+            <a:endParaRPr sz="1400"/>
           </a:p>
         </p:txBody>
       </p:sp>
@@ -1745,7 +1746,7 @@
         </p:nvGrpSpPr>
         <p:grpSpPr>
           <a:xfrm>
-            <a:off x="0" y="490"/>
+            <a:off x="1" y="490"/>
             <a:ext cx="5153705" cy="5134399"/>
             <a:chOff x="0" y="75"/>
             <a:chExt cx="5153705" cy="5152950"/>
@@ -1791,7 +1792,7 @@
                 </a:spcAft>
                 <a:buNone/>
               </a:pPr>
-              <a:endParaRPr/>
+              <a:endParaRPr sz="1400"/>
             </a:p>
           </p:txBody>
         </p:sp>
@@ -1835,7 +1836,7 @@
                 </a:spcAft>
                 <a:buNone/>
               </a:pPr>
-              <a:endParaRPr/>
+              <a:endParaRPr sz="1400"/>
             </a:p>
           </p:txBody>
         </p:sp>
@@ -1877,7 +1878,7 @@
                 </a:spcAft>
                 <a:buNone/>
               </a:pPr>
-              <a:endParaRPr/>
+              <a:endParaRPr sz="1400"/>
             </a:p>
           </p:txBody>
         </p:sp>
@@ -1919,7 +1920,7 @@
                 </a:spcAft>
                 <a:buNone/>
               </a:pPr>
-              <a:endParaRPr/>
+              <a:endParaRPr sz="1400"/>
             </a:p>
           </p:txBody>
         </p:sp>
@@ -1936,7 +1937,7 @@
         </p:nvSpPr>
         <p:spPr>
           <a:xfrm>
-            <a:off x="3537150" y="1578400"/>
+            <a:off x="3537150" y="1578401"/>
             <a:ext cx="5017500" cy="1578900"/>
           </a:xfrm>
           <a:prstGeom prst="rect">
@@ -2065,7 +2066,7 @@
         </p:nvSpPr>
         <p:spPr>
           <a:xfrm>
-            <a:off x="5083950" y="3924925"/>
+            <a:off x="5083951" y="3924925"/>
             <a:ext cx="3470700" cy="506100"/>
           </a:xfrm>
           <a:prstGeom prst="rect">
@@ -2221,7 +2222,7 @@
         </p:nvSpPr>
         <p:spPr>
           <a:xfrm>
-            <a:off x="8472458" y="4663217"/>
+            <a:off x="8472459" y="4663217"/>
             <a:ext cx="548700" cy="393600"/>
           </a:xfrm>
           <a:prstGeom prst="rect">
@@ -2271,20 +2272,12 @@
             </a:lvl9pPr>
           </a:lstStyle>
           <a:p>
-            <a:pPr marL="0" lvl="0" indent="0" algn="r" rtl="0">
-              <a:spcBef>
-                <a:spcPts val="0"/>
-              </a:spcBef>
-              <a:spcAft>
-                <a:spcPts val="0"/>
-              </a:spcAft>
-              <a:buNone/>
-            </a:pPr>
             <a:fld id="{00000000-1234-1234-1234-123412341234}" type="slidenum">
-              <a:rPr lang="fr"/>
+              <a:rPr lang="fr" smtClean="0"/>
+              <a:pPr/>
               <a:t>‹#›</a:t>
             </a:fld>
-            <a:endParaRPr/>
+            <a:endParaRPr lang="fr"/>
           </a:p>
         </p:txBody>
       </p:sp>
@@ -2321,7 +2314,7 @@
         </p:nvGrpSpPr>
         <p:grpSpPr>
           <a:xfrm>
-            <a:off x="4406400" y="0"/>
+            <a:off x="4406400" y="1"/>
             <a:ext cx="4737600" cy="5143065"/>
             <a:chOff x="4406400" y="0"/>
             <a:chExt cx="4737600" cy="5143065"/>
@@ -2367,7 +2360,7 @@
                 </a:spcAft>
                 <a:buNone/>
               </a:pPr>
-              <a:endParaRPr/>
+              <a:endParaRPr sz="1400"/>
             </a:p>
           </p:txBody>
         </p:sp>
@@ -2411,7 +2404,7 @@
                 </a:spcAft>
                 <a:buNone/>
               </a:pPr>
-              <a:endParaRPr/>
+              <a:endParaRPr sz="1400"/>
             </a:p>
           </p:txBody>
         </p:sp>
@@ -2455,7 +2448,7 @@
                 </a:spcAft>
                 <a:buNone/>
               </a:pPr>
-              <a:endParaRPr/>
+              <a:endParaRPr sz="1400"/>
             </a:p>
           </p:txBody>
         </p:sp>
@@ -2499,7 +2492,7 @@
                 </a:spcAft>
                 <a:buNone/>
               </a:pPr>
-              <a:endParaRPr/>
+              <a:endParaRPr sz="1400"/>
             </a:p>
           </p:txBody>
         </p:sp>
@@ -2543,7 +2536,7 @@
                 </a:spcAft>
                 <a:buNone/>
               </a:pPr>
-              <a:endParaRPr/>
+              <a:endParaRPr sz="1400"/>
             </a:p>
           </p:txBody>
         </p:sp>
@@ -2587,7 +2580,7 @@
                 </a:spcAft>
                 <a:buNone/>
               </a:pPr>
-              <a:endParaRPr/>
+              <a:endParaRPr sz="1400"/>
             </a:p>
           </p:txBody>
         </p:sp>
@@ -2631,7 +2624,7 @@
                 </a:spcAft>
                 <a:buNone/>
               </a:pPr>
-              <a:endParaRPr/>
+              <a:endParaRPr sz="1400"/>
             </a:p>
           </p:txBody>
         </p:sp>
@@ -2673,7 +2666,7 @@
                 </a:spcAft>
                 <a:buNone/>
               </a:pPr>
-              <a:endParaRPr/>
+              <a:endParaRPr sz="1400"/>
             </a:p>
           </p:txBody>
         </p:sp>
@@ -2717,7 +2710,7 @@
                 </a:spcAft>
                 <a:buNone/>
               </a:pPr>
-              <a:endParaRPr/>
+              <a:endParaRPr sz="1400"/>
             </a:p>
           </p:txBody>
         </p:sp>
@@ -2761,7 +2754,7 @@
                 </a:spcAft>
                 <a:buNone/>
               </a:pPr>
-              <a:endParaRPr/>
+              <a:endParaRPr sz="1400"/>
             </a:p>
           </p:txBody>
         </p:sp>
@@ -2805,7 +2798,7 @@
                 </a:spcAft>
                 <a:buNone/>
               </a:pPr>
-              <a:endParaRPr/>
+              <a:endParaRPr sz="1400"/>
             </a:p>
           </p:txBody>
         </p:sp>
@@ -2849,7 +2842,7 @@
                 </a:spcAft>
                 <a:buNone/>
               </a:pPr>
-              <a:endParaRPr/>
+              <a:endParaRPr sz="1400"/>
             </a:p>
           </p:txBody>
         </p:sp>
@@ -2893,7 +2886,7 @@
                 </a:spcAft>
                 <a:buNone/>
               </a:pPr>
-              <a:endParaRPr/>
+              <a:endParaRPr sz="1400"/>
             </a:p>
           </p:txBody>
         </p:sp>
@@ -2935,7 +2928,7 @@
                 </a:spcAft>
                 <a:buNone/>
               </a:pPr>
-              <a:endParaRPr/>
+              <a:endParaRPr sz="1400"/>
             </a:p>
           </p:txBody>
         </p:sp>
@@ -2979,7 +2972,7 @@
                 </a:spcAft>
                 <a:buNone/>
               </a:pPr>
-              <a:endParaRPr/>
+              <a:endParaRPr sz="1400"/>
             </a:p>
           </p:txBody>
         </p:sp>
@@ -3023,7 +3016,7 @@
                 </a:spcAft>
                 <a:buNone/>
               </a:pPr>
-              <a:endParaRPr/>
+              <a:endParaRPr sz="1400"/>
             </a:p>
           </p:txBody>
         </p:sp>
@@ -3067,7 +3060,7 @@
                 </a:spcAft>
                 <a:buNone/>
               </a:pPr>
-              <a:endParaRPr/>
+              <a:endParaRPr sz="1400"/>
             </a:p>
           </p:txBody>
         </p:sp>
@@ -3111,7 +3104,7 @@
                 </a:spcAft>
                 <a:buNone/>
               </a:pPr>
-              <a:endParaRPr/>
+              <a:endParaRPr sz="1400"/>
             </a:p>
           </p:txBody>
         </p:sp>
@@ -3128,7 +3121,7 @@
         </p:nvSpPr>
         <p:spPr>
           <a:xfrm>
-            <a:off x="823850" y="1284675"/>
+            <a:off x="823851" y="1284675"/>
             <a:ext cx="4776000" cy="1300800"/>
           </a:xfrm>
           <a:prstGeom prst="rect">
@@ -3259,7 +3252,7 @@
         </p:nvSpPr>
         <p:spPr>
           <a:xfrm>
-            <a:off x="823850" y="2643124"/>
+            <a:off x="823851" y="2643124"/>
             <a:ext cx="4776000" cy="1218900"/>
           </a:xfrm>
           <a:prstGeom prst="rect">
@@ -3271,7 +3264,7 @@
             <a:noAutofit/>
           </a:bodyPr>
           <a:lstStyle>
-            <a:lvl1pPr marL="457200" lvl="0" indent="-311150">
+            <a:lvl1pPr marL="457206" lvl="0" indent="-311154">
               <a:spcBef>
                 <a:spcPts val="0"/>
               </a:spcBef>
@@ -3282,7 +3275,7 @@
               <a:buChar char="●"/>
               <a:defRPr/>
             </a:lvl1pPr>
-            <a:lvl2pPr marL="914400" lvl="1" indent="-298450">
+            <a:lvl2pPr marL="914411" lvl="1" indent="-298454">
               <a:spcBef>
                 <a:spcPts val="1600"/>
               </a:spcBef>
@@ -3293,7 +3286,7 @@
               <a:buChar char="○"/>
               <a:defRPr/>
             </a:lvl2pPr>
-            <a:lvl3pPr marL="1371600" lvl="2" indent="-298450">
+            <a:lvl3pPr marL="1371617" lvl="2" indent="-298454">
               <a:spcBef>
                 <a:spcPts val="1600"/>
               </a:spcBef>
@@ -3304,7 +3297,7 @@
               <a:buChar char="■"/>
               <a:defRPr/>
             </a:lvl3pPr>
-            <a:lvl4pPr marL="1828800" lvl="3" indent="-298450">
+            <a:lvl4pPr marL="1828823" lvl="3" indent="-298454">
               <a:spcBef>
                 <a:spcPts val="1600"/>
               </a:spcBef>
@@ -3315,7 +3308,7 @@
               <a:buChar char="●"/>
               <a:defRPr/>
             </a:lvl4pPr>
-            <a:lvl5pPr marL="2286000" lvl="4" indent="-298450">
+            <a:lvl5pPr marL="2286029" lvl="4" indent="-298454">
               <a:spcBef>
                 <a:spcPts val="1600"/>
               </a:spcBef>
@@ -3326,7 +3319,7 @@
               <a:buChar char="○"/>
               <a:defRPr/>
             </a:lvl5pPr>
-            <a:lvl6pPr marL="2743200" lvl="5" indent="-298450">
+            <a:lvl6pPr marL="2743234" lvl="5" indent="-298454">
               <a:spcBef>
                 <a:spcPts val="1600"/>
               </a:spcBef>
@@ -3337,7 +3330,7 @@
               <a:buChar char="■"/>
               <a:defRPr/>
             </a:lvl6pPr>
-            <a:lvl7pPr marL="3200400" lvl="6" indent="-298450">
+            <a:lvl7pPr marL="3200440" lvl="6" indent="-298454">
               <a:spcBef>
                 <a:spcPts val="1600"/>
               </a:spcBef>
@@ -3348,7 +3341,7 @@
               <a:buChar char="●"/>
               <a:defRPr/>
             </a:lvl7pPr>
-            <a:lvl8pPr marL="3657600" lvl="7" indent="-298450">
+            <a:lvl8pPr marL="3657646" lvl="7" indent="-298454">
               <a:spcBef>
                 <a:spcPts val="1600"/>
               </a:spcBef>
@@ -3359,7 +3352,7 @@
               <a:buChar char="○"/>
               <a:defRPr/>
             </a:lvl8pPr>
-            <a:lvl9pPr marL="4114800" lvl="8" indent="-298450">
+            <a:lvl9pPr marL="4114851" lvl="8" indent="-298454">
               <a:spcBef>
                 <a:spcPts val="1600"/>
               </a:spcBef>
@@ -3388,7 +3381,7 @@
         </p:nvSpPr>
         <p:spPr>
           <a:xfrm>
-            <a:off x="8472458" y="4663217"/>
+            <a:off x="8472459" y="4663217"/>
             <a:ext cx="548700" cy="393600"/>
           </a:xfrm>
           <a:prstGeom prst="rect">
@@ -3438,20 +3431,12 @@
             </a:lvl9pPr>
           </a:lstStyle>
           <a:p>
-            <a:pPr marL="0" lvl="0" indent="0" algn="r" rtl="0">
-              <a:spcBef>
-                <a:spcPts val="0"/>
-              </a:spcBef>
-              <a:spcAft>
-                <a:spcPts val="0"/>
-              </a:spcAft>
-              <a:buNone/>
-            </a:pPr>
             <a:fld id="{00000000-1234-1234-1234-123412341234}" type="slidenum">
-              <a:rPr lang="fr"/>
+              <a:rPr lang="fr" smtClean="0"/>
+              <a:pPr/>
               <a:t>‹#›</a:t>
             </a:fld>
-            <a:endParaRPr/>
+            <a:endParaRPr lang="fr"/>
           </a:p>
         </p:txBody>
       </p:sp>
@@ -3492,7 +3477,7 @@
         </p:nvSpPr>
         <p:spPr>
           <a:xfrm>
-            <a:off x="8472458" y="4663217"/>
+            <a:off x="8472459" y="4663217"/>
             <a:ext cx="548700" cy="393600"/>
           </a:xfrm>
           <a:prstGeom prst="rect">
@@ -3542,20 +3527,12 @@
             </a:lvl9pPr>
           </a:lstStyle>
           <a:p>
-            <a:pPr marL="0" lvl="0" indent="0" algn="r" rtl="0">
-              <a:spcBef>
-                <a:spcPts val="0"/>
-              </a:spcBef>
-              <a:spcAft>
-                <a:spcPts val="0"/>
-              </a:spcAft>
-              <a:buNone/>
-            </a:pPr>
             <a:fld id="{00000000-1234-1234-1234-123412341234}" type="slidenum">
-              <a:rPr lang="fr"/>
+              <a:rPr lang="fr" smtClean="0"/>
+              <a:pPr/>
               <a:t>‹#›</a:t>
             </a:fld>
-            <a:endParaRPr/>
+            <a:endParaRPr lang="fr"/>
           </a:p>
         </p:txBody>
       </p:sp>
@@ -3592,7 +3569,7 @@
         </p:nvGrpSpPr>
         <p:grpSpPr>
           <a:xfrm>
-            <a:off x="4406400" y="0"/>
+            <a:off x="4406400" y="1"/>
             <a:ext cx="4737600" cy="5143065"/>
             <a:chOff x="4406400" y="0"/>
             <a:chExt cx="4737600" cy="5143065"/>
@@ -3638,7 +3615,7 @@
                 </a:spcAft>
                 <a:buNone/>
               </a:pPr>
-              <a:endParaRPr/>
+              <a:endParaRPr sz="1400"/>
             </a:p>
           </p:txBody>
         </p:sp>
@@ -3682,7 +3659,7 @@
                 </a:spcAft>
                 <a:buNone/>
               </a:pPr>
-              <a:endParaRPr/>
+              <a:endParaRPr sz="1400"/>
             </a:p>
           </p:txBody>
         </p:sp>
@@ -3726,7 +3703,7 @@
                 </a:spcAft>
                 <a:buNone/>
               </a:pPr>
-              <a:endParaRPr/>
+              <a:endParaRPr sz="1400"/>
             </a:p>
           </p:txBody>
         </p:sp>
@@ -3770,7 +3747,7 @@
                 </a:spcAft>
                 <a:buNone/>
               </a:pPr>
-              <a:endParaRPr/>
+              <a:endParaRPr sz="1400"/>
             </a:p>
           </p:txBody>
         </p:sp>
@@ -3814,7 +3791,7 @@
                 </a:spcAft>
                 <a:buNone/>
               </a:pPr>
-              <a:endParaRPr/>
+              <a:endParaRPr sz="1400"/>
             </a:p>
           </p:txBody>
         </p:sp>
@@ -3858,7 +3835,7 @@
                 </a:spcAft>
                 <a:buNone/>
               </a:pPr>
-              <a:endParaRPr/>
+              <a:endParaRPr sz="1400"/>
             </a:p>
           </p:txBody>
         </p:sp>
@@ -3902,7 +3879,7 @@
                 </a:spcAft>
                 <a:buNone/>
               </a:pPr>
-              <a:endParaRPr/>
+              <a:endParaRPr sz="1400"/>
             </a:p>
           </p:txBody>
         </p:sp>
@@ -3944,7 +3921,7 @@
                 </a:spcAft>
                 <a:buNone/>
               </a:pPr>
-              <a:endParaRPr/>
+              <a:endParaRPr sz="1400"/>
             </a:p>
           </p:txBody>
         </p:sp>
@@ -3988,7 +3965,7 @@
                 </a:spcAft>
                 <a:buNone/>
               </a:pPr>
-              <a:endParaRPr/>
+              <a:endParaRPr sz="1400"/>
             </a:p>
           </p:txBody>
         </p:sp>
@@ -4032,7 +4009,7 @@
                 </a:spcAft>
                 <a:buNone/>
               </a:pPr>
-              <a:endParaRPr/>
+              <a:endParaRPr sz="1400"/>
             </a:p>
           </p:txBody>
         </p:sp>
@@ -4076,7 +4053,7 @@
                 </a:spcAft>
                 <a:buNone/>
               </a:pPr>
-              <a:endParaRPr/>
+              <a:endParaRPr sz="1400"/>
             </a:p>
           </p:txBody>
         </p:sp>
@@ -4120,7 +4097,7 @@
                 </a:spcAft>
                 <a:buNone/>
               </a:pPr>
-              <a:endParaRPr/>
+              <a:endParaRPr sz="1400"/>
             </a:p>
           </p:txBody>
         </p:sp>
@@ -4164,7 +4141,7 @@
                 </a:spcAft>
                 <a:buNone/>
               </a:pPr>
-              <a:endParaRPr/>
+              <a:endParaRPr sz="1400"/>
             </a:p>
           </p:txBody>
         </p:sp>
@@ -4206,7 +4183,7 @@
                 </a:spcAft>
                 <a:buNone/>
               </a:pPr>
-              <a:endParaRPr/>
+              <a:endParaRPr sz="1400"/>
             </a:p>
           </p:txBody>
         </p:sp>
@@ -4250,7 +4227,7 @@
                 </a:spcAft>
                 <a:buNone/>
               </a:pPr>
-              <a:endParaRPr/>
+              <a:endParaRPr sz="1400"/>
             </a:p>
           </p:txBody>
         </p:sp>
@@ -4294,7 +4271,7 @@
                 </a:spcAft>
                 <a:buNone/>
               </a:pPr>
-              <a:endParaRPr/>
+              <a:endParaRPr sz="1400"/>
             </a:p>
           </p:txBody>
         </p:sp>
@@ -4338,7 +4315,7 @@
                 </a:spcAft>
                 <a:buNone/>
               </a:pPr>
-              <a:endParaRPr/>
+              <a:endParaRPr sz="1400"/>
             </a:p>
           </p:txBody>
         </p:sp>
@@ -4382,7 +4359,7 @@
                 </a:spcAft>
                 <a:buNone/>
               </a:pPr>
-              <a:endParaRPr/>
+              <a:endParaRPr sz="1400"/>
             </a:p>
           </p:txBody>
         </p:sp>
@@ -4399,8 +4376,8 @@
         </p:nvSpPr>
         <p:spPr>
           <a:xfrm>
-            <a:off x="823850" y="2053000"/>
-            <a:ext cx="4587000" cy="1148700"/>
+            <a:off x="823849" y="2053000"/>
+            <a:ext cx="4587001" cy="1148700"/>
           </a:xfrm>
           <a:prstGeom prst="rect">
             <a:avLst/>
@@ -4528,7 +4505,7 @@
         </p:nvSpPr>
         <p:spPr>
           <a:xfrm>
-            <a:off x="8472458" y="4663217"/>
+            <a:off x="8472459" y="4663217"/>
             <a:ext cx="548700" cy="393600"/>
           </a:xfrm>
           <a:prstGeom prst="rect">
@@ -4578,20 +4555,12 @@
             </a:lvl9pPr>
           </a:lstStyle>
           <a:p>
-            <a:pPr marL="0" lvl="0" indent="0" algn="r" rtl="0">
-              <a:spcBef>
-                <a:spcPts val="0"/>
-              </a:spcBef>
-              <a:spcAft>
-                <a:spcPts val="0"/>
-              </a:spcAft>
-              <a:buNone/>
-            </a:pPr>
             <a:fld id="{00000000-1234-1234-1234-123412341234}" type="slidenum">
-              <a:rPr lang="fr"/>
+              <a:rPr lang="fr" smtClean="0"/>
+              <a:pPr/>
               <a:t>‹#›</a:t>
             </a:fld>
-            <a:endParaRPr/>
+            <a:endParaRPr lang="fr"/>
           </a:p>
         </p:txBody>
       </p:sp>
@@ -4628,8 +4597,8 @@
         </p:nvGrpSpPr>
         <p:grpSpPr>
           <a:xfrm>
-            <a:off x="0" y="381001"/>
-            <a:ext cx="1037850" cy="1016287"/>
+            <a:off x="1" y="381001"/>
+            <a:ext cx="1037851" cy="1016287"/>
             <a:chOff x="0" y="381001"/>
             <a:chExt cx="1037850" cy="1016287"/>
           </a:xfrm>
@@ -4672,7 +4641,7 @@
                 </a:spcAft>
                 <a:buNone/>
               </a:pPr>
-              <a:endParaRPr/>
+              <a:endParaRPr sz="1400"/>
             </a:p>
           </p:txBody>
         </p:sp>
@@ -4714,7 +4683,7 @@
                 </a:spcAft>
                 <a:buNone/>
               </a:pPr>
-              <a:endParaRPr/>
+              <a:endParaRPr sz="1400"/>
             </a:p>
           </p:txBody>
         </p:sp>
@@ -4731,7 +4700,7 @@
         </p:nvSpPr>
         <p:spPr>
           <a:xfrm>
-            <a:off x="1297500" y="393750"/>
+            <a:off x="1297501" y="393750"/>
             <a:ext cx="7038900" cy="914100"/>
           </a:xfrm>
           <a:prstGeom prst="rect">
@@ -4860,7 +4829,7 @@
         </p:nvSpPr>
         <p:spPr>
           <a:xfrm>
-            <a:off x="1297500" y="1567550"/>
+            <a:off x="1297501" y="1567550"/>
             <a:ext cx="7038900" cy="2911200"/>
           </a:xfrm>
           <a:prstGeom prst="rect">
@@ -4872,7 +4841,7 @@
             <a:noAutofit/>
           </a:bodyPr>
           <a:lstStyle>
-            <a:lvl1pPr marL="457200" lvl="0" indent="-311150">
+            <a:lvl1pPr marL="457206" lvl="0" indent="-311154">
               <a:spcBef>
                 <a:spcPts val="0"/>
               </a:spcBef>
@@ -4883,7 +4852,7 @@
               <a:buChar char="●"/>
               <a:defRPr/>
             </a:lvl1pPr>
-            <a:lvl2pPr marL="914400" lvl="1" indent="-298450">
+            <a:lvl2pPr marL="914411" lvl="1" indent="-298454">
               <a:spcBef>
                 <a:spcPts val="1600"/>
               </a:spcBef>
@@ -4894,7 +4863,7 @@
               <a:buChar char="○"/>
               <a:defRPr/>
             </a:lvl2pPr>
-            <a:lvl3pPr marL="1371600" lvl="2" indent="-298450">
+            <a:lvl3pPr marL="1371617" lvl="2" indent="-298454">
               <a:spcBef>
                 <a:spcPts val="1600"/>
               </a:spcBef>
@@ -4905,7 +4874,7 @@
               <a:buChar char="■"/>
               <a:defRPr/>
             </a:lvl3pPr>
-            <a:lvl4pPr marL="1828800" lvl="3" indent="-298450">
+            <a:lvl4pPr marL="1828823" lvl="3" indent="-298454">
               <a:spcBef>
                 <a:spcPts val="1600"/>
               </a:spcBef>
@@ -4916,7 +4885,7 @@
               <a:buChar char="●"/>
               <a:defRPr/>
             </a:lvl4pPr>
-            <a:lvl5pPr marL="2286000" lvl="4" indent="-298450">
+            <a:lvl5pPr marL="2286029" lvl="4" indent="-298454">
               <a:spcBef>
                 <a:spcPts val="1600"/>
               </a:spcBef>
@@ -4927,7 +4896,7 @@
               <a:buChar char="○"/>
               <a:defRPr/>
             </a:lvl5pPr>
-            <a:lvl6pPr marL="2743200" lvl="5" indent="-298450">
+            <a:lvl6pPr marL="2743234" lvl="5" indent="-298454">
               <a:spcBef>
                 <a:spcPts val="1600"/>
               </a:spcBef>
@@ -4938,7 +4907,7 @@
               <a:buChar char="■"/>
               <a:defRPr/>
             </a:lvl6pPr>
-            <a:lvl7pPr marL="3200400" lvl="6" indent="-298450">
+            <a:lvl7pPr marL="3200440" lvl="6" indent="-298454">
               <a:spcBef>
                 <a:spcPts val="1600"/>
               </a:spcBef>
@@ -4949,7 +4918,7 @@
               <a:buChar char="●"/>
               <a:defRPr/>
             </a:lvl7pPr>
-            <a:lvl8pPr marL="3657600" lvl="7" indent="-298450">
+            <a:lvl8pPr marL="3657646" lvl="7" indent="-298454">
               <a:spcBef>
                 <a:spcPts val="1600"/>
               </a:spcBef>
@@ -4960,7 +4929,7 @@
               <a:buChar char="○"/>
               <a:defRPr/>
             </a:lvl8pPr>
-            <a:lvl9pPr marL="4114800" lvl="8" indent="-298450">
+            <a:lvl9pPr marL="4114851" lvl="8" indent="-298454">
               <a:spcBef>
                 <a:spcPts val="1600"/>
               </a:spcBef>
@@ -4989,7 +4958,7 @@
         </p:nvSpPr>
         <p:spPr>
           <a:xfrm>
-            <a:off x="8472458" y="4663217"/>
+            <a:off x="8472459" y="4663217"/>
             <a:ext cx="548700" cy="393600"/>
           </a:xfrm>
           <a:prstGeom prst="rect">
@@ -5039,20 +5008,12 @@
             </a:lvl9pPr>
           </a:lstStyle>
           <a:p>
-            <a:pPr marL="0" lvl="0" indent="0" algn="r" rtl="0">
-              <a:spcBef>
-                <a:spcPts val="0"/>
-              </a:spcBef>
-              <a:spcAft>
-                <a:spcPts val="0"/>
-              </a:spcAft>
-              <a:buNone/>
-            </a:pPr>
             <a:fld id="{00000000-1234-1234-1234-123412341234}" type="slidenum">
-              <a:rPr lang="fr"/>
+              <a:rPr lang="fr" smtClean="0"/>
+              <a:pPr/>
               <a:t>‹#›</a:t>
             </a:fld>
-            <a:endParaRPr/>
+            <a:endParaRPr lang="fr"/>
           </a:p>
         </p:txBody>
       </p:sp>
@@ -5089,8 +5050,8 @@
         </p:nvGrpSpPr>
         <p:grpSpPr>
           <a:xfrm>
-            <a:off x="0" y="381001"/>
-            <a:ext cx="1037850" cy="1016287"/>
+            <a:off x="1" y="381001"/>
+            <a:ext cx="1037851" cy="1016287"/>
             <a:chOff x="0" y="381001"/>
             <a:chExt cx="1037850" cy="1016287"/>
           </a:xfrm>
@@ -5133,7 +5094,7 @@
                 </a:spcAft>
                 <a:buNone/>
               </a:pPr>
-              <a:endParaRPr/>
+              <a:endParaRPr sz="1400"/>
             </a:p>
           </p:txBody>
         </p:sp>
@@ -5175,7 +5136,7 @@
                 </a:spcAft>
                 <a:buNone/>
               </a:pPr>
-              <a:endParaRPr/>
+              <a:endParaRPr sz="1400"/>
             </a:p>
           </p:txBody>
         </p:sp>
@@ -5192,7 +5153,7 @@
         </p:nvSpPr>
         <p:spPr>
           <a:xfrm>
-            <a:off x="1297500" y="393750"/>
+            <a:off x="1297501" y="393750"/>
             <a:ext cx="7038900" cy="914100"/>
           </a:xfrm>
           <a:prstGeom prst="rect">
@@ -5333,7 +5294,7 @@
             <a:noAutofit/>
           </a:bodyPr>
           <a:lstStyle>
-            <a:lvl1pPr marL="457200" lvl="0" indent="-311150">
+            <a:lvl1pPr marL="457206" lvl="0" indent="-311154">
               <a:spcBef>
                 <a:spcPts val="0"/>
               </a:spcBef>
@@ -5344,7 +5305,7 @@
               <a:buChar char="●"/>
               <a:defRPr/>
             </a:lvl1pPr>
-            <a:lvl2pPr marL="914400" lvl="1" indent="-298450">
+            <a:lvl2pPr marL="914411" lvl="1" indent="-298454">
               <a:spcBef>
                 <a:spcPts val="1600"/>
               </a:spcBef>
@@ -5355,7 +5316,7 @@
               <a:buChar char="○"/>
               <a:defRPr/>
             </a:lvl2pPr>
-            <a:lvl3pPr marL="1371600" lvl="2" indent="-298450">
+            <a:lvl3pPr marL="1371617" lvl="2" indent="-298454">
               <a:spcBef>
                 <a:spcPts val="1600"/>
               </a:spcBef>
@@ -5366,7 +5327,7 @@
               <a:buChar char="■"/>
               <a:defRPr/>
             </a:lvl3pPr>
-            <a:lvl4pPr marL="1828800" lvl="3" indent="-298450">
+            <a:lvl4pPr marL="1828823" lvl="3" indent="-298454">
               <a:spcBef>
                 <a:spcPts val="1600"/>
               </a:spcBef>
@@ -5377,7 +5338,7 @@
               <a:buChar char="●"/>
               <a:defRPr/>
             </a:lvl4pPr>
-            <a:lvl5pPr marL="2286000" lvl="4" indent="-298450">
+            <a:lvl5pPr marL="2286029" lvl="4" indent="-298454">
               <a:spcBef>
                 <a:spcPts val="1600"/>
               </a:spcBef>
@@ -5388,7 +5349,7 @@
               <a:buChar char="○"/>
               <a:defRPr/>
             </a:lvl5pPr>
-            <a:lvl6pPr marL="2743200" lvl="5" indent="-298450">
+            <a:lvl6pPr marL="2743234" lvl="5" indent="-298454">
               <a:spcBef>
                 <a:spcPts val="1600"/>
               </a:spcBef>
@@ -5399,7 +5360,7 @@
               <a:buChar char="■"/>
               <a:defRPr/>
             </a:lvl6pPr>
-            <a:lvl7pPr marL="3200400" lvl="6" indent="-298450">
+            <a:lvl7pPr marL="3200440" lvl="6" indent="-298454">
               <a:spcBef>
                 <a:spcPts val="1600"/>
               </a:spcBef>
@@ -5410,7 +5371,7 @@
               <a:buChar char="●"/>
               <a:defRPr/>
             </a:lvl7pPr>
-            <a:lvl8pPr marL="3657600" lvl="7" indent="-298450">
+            <a:lvl8pPr marL="3657646" lvl="7" indent="-298454">
               <a:spcBef>
                 <a:spcPts val="1600"/>
               </a:spcBef>
@@ -5421,7 +5382,7 @@
               <a:buChar char="○"/>
               <a:defRPr/>
             </a:lvl8pPr>
-            <a:lvl9pPr marL="4114800" lvl="8" indent="-298450">
+            <a:lvl9pPr marL="4114851" lvl="8" indent="-298454">
               <a:spcBef>
                 <a:spcPts val="1600"/>
               </a:spcBef>
@@ -5462,7 +5423,7 @@
             <a:noAutofit/>
           </a:bodyPr>
           <a:lstStyle>
-            <a:lvl1pPr marL="457200" lvl="0" indent="-311150">
+            <a:lvl1pPr marL="457206" lvl="0" indent="-311154">
               <a:spcBef>
                 <a:spcPts val="0"/>
               </a:spcBef>
@@ -5473,7 +5434,7 @@
               <a:buChar char="●"/>
               <a:defRPr/>
             </a:lvl1pPr>
-            <a:lvl2pPr marL="914400" lvl="1" indent="-298450">
+            <a:lvl2pPr marL="914411" lvl="1" indent="-298454">
               <a:spcBef>
                 <a:spcPts val="1600"/>
               </a:spcBef>
@@ -5484,7 +5445,7 @@
               <a:buChar char="○"/>
               <a:defRPr/>
             </a:lvl2pPr>
-            <a:lvl3pPr marL="1371600" lvl="2" indent="-298450">
+            <a:lvl3pPr marL="1371617" lvl="2" indent="-298454">
               <a:spcBef>
                 <a:spcPts val="1600"/>
               </a:spcBef>
@@ -5495,7 +5456,7 @@
               <a:buChar char="■"/>
               <a:defRPr/>
             </a:lvl3pPr>
-            <a:lvl4pPr marL="1828800" lvl="3" indent="-298450">
+            <a:lvl4pPr marL="1828823" lvl="3" indent="-298454">
               <a:spcBef>
                 <a:spcPts val="1600"/>
               </a:spcBef>
@@ -5506,7 +5467,7 @@
               <a:buChar char="●"/>
               <a:defRPr/>
             </a:lvl4pPr>
-            <a:lvl5pPr marL="2286000" lvl="4" indent="-298450">
+            <a:lvl5pPr marL="2286029" lvl="4" indent="-298454">
               <a:spcBef>
                 <a:spcPts val="1600"/>
               </a:spcBef>
@@ -5517,7 +5478,7 @@
               <a:buChar char="○"/>
               <a:defRPr/>
             </a:lvl5pPr>
-            <a:lvl6pPr marL="2743200" lvl="5" indent="-298450">
+            <a:lvl6pPr marL="2743234" lvl="5" indent="-298454">
               <a:spcBef>
                 <a:spcPts val="1600"/>
               </a:spcBef>
@@ -5528,7 +5489,7 @@
               <a:buChar char="■"/>
               <a:defRPr/>
             </a:lvl6pPr>
-            <a:lvl7pPr marL="3200400" lvl="6" indent="-298450">
+            <a:lvl7pPr marL="3200440" lvl="6" indent="-298454">
               <a:spcBef>
                 <a:spcPts val="1600"/>
               </a:spcBef>
@@ -5539,7 +5500,7 @@
               <a:buChar char="●"/>
               <a:defRPr/>
             </a:lvl7pPr>
-            <a:lvl8pPr marL="3657600" lvl="7" indent="-298450">
+            <a:lvl8pPr marL="3657646" lvl="7" indent="-298454">
               <a:spcBef>
                 <a:spcPts val="1600"/>
               </a:spcBef>
@@ -5550,7 +5511,7 @@
               <a:buChar char="○"/>
               <a:defRPr/>
             </a:lvl8pPr>
-            <a:lvl9pPr marL="4114800" lvl="8" indent="-298450">
+            <a:lvl9pPr marL="4114851" lvl="8" indent="-298454">
               <a:spcBef>
                 <a:spcPts val="1600"/>
               </a:spcBef>
@@ -5579,7 +5540,7 @@
         </p:nvSpPr>
         <p:spPr>
           <a:xfrm>
-            <a:off x="8472458" y="4663217"/>
+            <a:off x="8472459" y="4663217"/>
             <a:ext cx="548700" cy="393600"/>
           </a:xfrm>
           <a:prstGeom prst="rect">
@@ -5629,20 +5590,12 @@
             </a:lvl9pPr>
           </a:lstStyle>
           <a:p>
-            <a:pPr marL="0" lvl="0" indent="0" algn="r" rtl="0">
-              <a:spcBef>
-                <a:spcPts val="0"/>
-              </a:spcBef>
-              <a:spcAft>
-                <a:spcPts val="0"/>
-              </a:spcAft>
-              <a:buNone/>
-            </a:pPr>
             <a:fld id="{00000000-1234-1234-1234-123412341234}" type="slidenum">
-              <a:rPr lang="fr"/>
+              <a:rPr lang="fr" smtClean="0"/>
+              <a:pPr/>
               <a:t>‹#›</a:t>
             </a:fld>
-            <a:endParaRPr/>
+            <a:endParaRPr lang="fr"/>
           </a:p>
         </p:txBody>
       </p:sp>
@@ -5679,8 +5632,8 @@
         </p:nvGrpSpPr>
         <p:grpSpPr>
           <a:xfrm>
-            <a:off x="0" y="381001"/>
-            <a:ext cx="1037850" cy="1016287"/>
+            <a:off x="1" y="381001"/>
+            <a:ext cx="1037851" cy="1016287"/>
             <a:chOff x="0" y="381001"/>
             <a:chExt cx="1037850" cy="1016287"/>
           </a:xfrm>
@@ -5723,7 +5676,7 @@
                 </a:spcAft>
                 <a:buNone/>
               </a:pPr>
-              <a:endParaRPr/>
+              <a:endParaRPr sz="1400"/>
             </a:p>
           </p:txBody>
         </p:sp>
@@ -5765,7 +5718,7 @@
                 </a:spcAft>
                 <a:buNone/>
               </a:pPr>
-              <a:endParaRPr/>
+              <a:endParaRPr sz="1400"/>
             </a:p>
           </p:txBody>
         </p:sp>
@@ -5782,7 +5735,7 @@
         </p:nvSpPr>
         <p:spPr>
           <a:xfrm>
-            <a:off x="1297500" y="393750"/>
+            <a:off x="1297501" y="393750"/>
             <a:ext cx="7038900" cy="914100"/>
           </a:xfrm>
           <a:prstGeom prst="rect">
@@ -5911,7 +5864,7 @@
         </p:nvSpPr>
         <p:spPr>
           <a:xfrm>
-            <a:off x="8472458" y="4663217"/>
+            <a:off x="8472459" y="4663217"/>
             <a:ext cx="548700" cy="393600"/>
           </a:xfrm>
           <a:prstGeom prst="rect">
@@ -5961,20 +5914,12 @@
             </a:lvl9pPr>
           </a:lstStyle>
           <a:p>
-            <a:pPr marL="0" lvl="0" indent="0" algn="r" rtl="0">
-              <a:spcBef>
-                <a:spcPts val="0"/>
-              </a:spcBef>
-              <a:spcAft>
-                <a:spcPts val="0"/>
-              </a:spcAft>
-              <a:buNone/>
-            </a:pPr>
             <a:fld id="{00000000-1234-1234-1234-123412341234}" type="slidenum">
-              <a:rPr lang="fr"/>
+              <a:rPr lang="fr" smtClean="0"/>
+              <a:pPr/>
               <a:t>‹#›</a:t>
             </a:fld>
-            <a:endParaRPr/>
+            <a:endParaRPr lang="fr"/>
           </a:p>
         </p:txBody>
       </p:sp>
@@ -6011,8 +5956,8 @@
         </p:nvGrpSpPr>
         <p:grpSpPr>
           <a:xfrm>
-            <a:off x="0" y="381001"/>
-            <a:ext cx="1037850" cy="1016287"/>
+            <a:off x="1" y="381001"/>
+            <a:ext cx="1037851" cy="1016287"/>
             <a:chOff x="0" y="381001"/>
             <a:chExt cx="1037850" cy="1016287"/>
           </a:xfrm>
@@ -6055,7 +6000,7 @@
                 </a:spcAft>
                 <a:buNone/>
               </a:pPr>
-              <a:endParaRPr/>
+              <a:endParaRPr sz="1400"/>
             </a:p>
           </p:txBody>
         </p:sp>
@@ -6097,7 +6042,7 @@
                 </a:spcAft>
                 <a:buNone/>
               </a:pPr>
-              <a:endParaRPr/>
+              <a:endParaRPr sz="1400"/>
             </a:p>
           </p:txBody>
         </p:sp>
@@ -6114,7 +6059,7 @@
         </p:nvSpPr>
         <p:spPr>
           <a:xfrm>
-            <a:off x="1297500" y="393750"/>
+            <a:off x="1297501" y="393750"/>
             <a:ext cx="3798900" cy="1493100"/>
           </a:xfrm>
           <a:prstGeom prst="rect">
@@ -6243,7 +6188,7 @@
         </p:nvSpPr>
         <p:spPr>
           <a:xfrm>
-            <a:off x="1297500" y="1972550"/>
+            <a:off x="1297501" y="1972550"/>
             <a:ext cx="3798900" cy="2415900"/>
           </a:xfrm>
           <a:prstGeom prst="rect">
@@ -6255,7 +6200,7 @@
             <a:noAutofit/>
           </a:bodyPr>
           <a:lstStyle>
-            <a:lvl1pPr marL="457200" lvl="0" indent="-311150">
+            <a:lvl1pPr marL="457206" lvl="0" indent="-311154">
               <a:spcBef>
                 <a:spcPts val="0"/>
               </a:spcBef>
@@ -6266,7 +6211,7 @@
               <a:buChar char="●"/>
               <a:defRPr/>
             </a:lvl1pPr>
-            <a:lvl2pPr marL="914400" lvl="1" indent="-298450">
+            <a:lvl2pPr marL="914411" lvl="1" indent="-298454">
               <a:spcBef>
                 <a:spcPts val="1600"/>
               </a:spcBef>
@@ -6277,7 +6222,7 @@
               <a:buChar char="○"/>
               <a:defRPr/>
             </a:lvl2pPr>
-            <a:lvl3pPr marL="1371600" lvl="2" indent="-298450">
+            <a:lvl3pPr marL="1371617" lvl="2" indent="-298454">
               <a:spcBef>
                 <a:spcPts val="1600"/>
               </a:spcBef>
@@ -6288,7 +6233,7 @@
               <a:buChar char="■"/>
               <a:defRPr/>
             </a:lvl3pPr>
-            <a:lvl4pPr marL="1828800" lvl="3" indent="-298450">
+            <a:lvl4pPr marL="1828823" lvl="3" indent="-298454">
               <a:spcBef>
                 <a:spcPts val="1600"/>
               </a:spcBef>
@@ -6299,7 +6244,7 @@
               <a:buChar char="●"/>
               <a:defRPr/>
             </a:lvl4pPr>
-            <a:lvl5pPr marL="2286000" lvl="4" indent="-298450">
+            <a:lvl5pPr marL="2286029" lvl="4" indent="-298454">
               <a:spcBef>
                 <a:spcPts val="1600"/>
               </a:spcBef>
@@ -6310,7 +6255,7 @@
               <a:buChar char="○"/>
               <a:defRPr/>
             </a:lvl5pPr>
-            <a:lvl6pPr marL="2743200" lvl="5" indent="-298450">
+            <a:lvl6pPr marL="2743234" lvl="5" indent="-298454">
               <a:spcBef>
                 <a:spcPts val="1600"/>
               </a:spcBef>
@@ -6321,7 +6266,7 @@
               <a:buChar char="■"/>
               <a:defRPr/>
             </a:lvl6pPr>
-            <a:lvl7pPr marL="3200400" lvl="6" indent="-298450">
+            <a:lvl7pPr marL="3200440" lvl="6" indent="-298454">
               <a:spcBef>
                 <a:spcPts val="1600"/>
               </a:spcBef>
@@ -6332,7 +6277,7 @@
               <a:buChar char="●"/>
               <a:defRPr/>
             </a:lvl7pPr>
-            <a:lvl8pPr marL="3657600" lvl="7" indent="-298450">
+            <a:lvl8pPr marL="3657646" lvl="7" indent="-298454">
               <a:spcBef>
                 <a:spcPts val="1600"/>
               </a:spcBef>
@@ -6343,7 +6288,7 @@
               <a:buChar char="○"/>
               <a:defRPr/>
             </a:lvl8pPr>
-            <a:lvl9pPr marL="4114800" lvl="8" indent="-298450">
+            <a:lvl9pPr marL="4114851" lvl="8" indent="-298454">
               <a:spcBef>
                 <a:spcPts val="1600"/>
               </a:spcBef>
@@ -6372,7 +6317,7 @@
         </p:nvSpPr>
         <p:spPr>
           <a:xfrm>
-            <a:off x="8472458" y="4663217"/>
+            <a:off x="8472459" y="4663217"/>
             <a:ext cx="548700" cy="393600"/>
           </a:xfrm>
           <a:prstGeom prst="rect">
@@ -6422,20 +6367,12 @@
             </a:lvl9pPr>
           </a:lstStyle>
           <a:p>
-            <a:pPr marL="0" lvl="0" indent="0" algn="r" rtl="0">
-              <a:spcBef>
-                <a:spcPts val="0"/>
-              </a:spcBef>
-              <a:spcAft>
-                <a:spcPts val="0"/>
-              </a:spcAft>
-              <a:buNone/>
-            </a:pPr>
             <a:fld id="{00000000-1234-1234-1234-123412341234}" type="slidenum">
-              <a:rPr lang="fr"/>
+              <a:rPr lang="fr" smtClean="0"/>
+              <a:pPr/>
               <a:t>‹#›</a:t>
             </a:fld>
-            <a:endParaRPr/>
+            <a:endParaRPr lang="fr"/>
           </a:p>
         </p:txBody>
       </p:sp>
@@ -6518,7 +6455,7 @@
                 </a:spcAft>
                 <a:buNone/>
               </a:pPr>
-              <a:endParaRPr/>
+              <a:endParaRPr sz="1400"/>
             </a:p>
           </p:txBody>
         </p:sp>
@@ -6562,7 +6499,7 @@
                 </a:spcAft>
                 <a:buNone/>
               </a:pPr>
-              <a:endParaRPr/>
+              <a:endParaRPr sz="1400"/>
             </a:p>
           </p:txBody>
         </p:sp>
@@ -6606,7 +6543,7 @@
                 </a:spcAft>
                 <a:buNone/>
               </a:pPr>
-              <a:endParaRPr/>
+              <a:endParaRPr sz="1400"/>
             </a:p>
           </p:txBody>
         </p:sp>
@@ -6650,7 +6587,7 @@
                 </a:spcAft>
                 <a:buNone/>
               </a:pPr>
-              <a:endParaRPr/>
+              <a:endParaRPr sz="1400"/>
             </a:p>
           </p:txBody>
         </p:sp>
@@ -6694,7 +6631,7 @@
                 </a:spcAft>
                 <a:buNone/>
               </a:pPr>
-              <a:endParaRPr/>
+              <a:endParaRPr sz="1400"/>
             </a:p>
           </p:txBody>
         </p:sp>
@@ -6738,7 +6675,7 @@
                 </a:spcAft>
                 <a:buNone/>
               </a:pPr>
-              <a:endParaRPr/>
+              <a:endParaRPr sz="1400"/>
             </a:p>
           </p:txBody>
         </p:sp>
@@ -6782,7 +6719,7 @@
                 </a:spcAft>
                 <a:buNone/>
               </a:pPr>
-              <a:endParaRPr/>
+              <a:endParaRPr sz="1400"/>
             </a:p>
           </p:txBody>
         </p:sp>
@@ -6824,7 +6761,7 @@
                 </a:spcAft>
                 <a:buNone/>
               </a:pPr>
-              <a:endParaRPr/>
+              <a:endParaRPr sz="1400"/>
             </a:p>
           </p:txBody>
         </p:sp>
@@ -6868,7 +6805,7 @@
                 </a:spcAft>
                 <a:buNone/>
               </a:pPr>
-              <a:endParaRPr/>
+              <a:endParaRPr sz="1400"/>
             </a:p>
           </p:txBody>
         </p:sp>
@@ -6912,7 +6849,7 @@
                 </a:spcAft>
                 <a:buNone/>
               </a:pPr>
-              <a:endParaRPr/>
+              <a:endParaRPr sz="1400"/>
             </a:p>
           </p:txBody>
         </p:sp>
@@ -6956,7 +6893,7 @@
                 </a:spcAft>
                 <a:buNone/>
               </a:pPr>
-              <a:endParaRPr/>
+              <a:endParaRPr sz="1400"/>
             </a:p>
           </p:txBody>
         </p:sp>
@@ -7000,7 +6937,7 @@
                 </a:spcAft>
                 <a:buNone/>
               </a:pPr>
-              <a:endParaRPr/>
+              <a:endParaRPr sz="1400"/>
             </a:p>
           </p:txBody>
         </p:sp>
@@ -7044,7 +6981,7 @@
                 </a:spcAft>
                 <a:buNone/>
               </a:pPr>
-              <a:endParaRPr/>
+              <a:endParaRPr sz="1400"/>
             </a:p>
           </p:txBody>
         </p:sp>
@@ -7086,7 +7023,7 @@
                 </a:spcAft>
                 <a:buNone/>
               </a:pPr>
-              <a:endParaRPr/>
+              <a:endParaRPr sz="1400"/>
             </a:p>
           </p:txBody>
         </p:sp>
@@ -7130,7 +7067,7 @@
                 </a:spcAft>
                 <a:buNone/>
               </a:pPr>
-              <a:endParaRPr/>
+              <a:endParaRPr sz="1400"/>
             </a:p>
           </p:txBody>
         </p:sp>
@@ -7174,7 +7111,7 @@
                 </a:spcAft>
                 <a:buNone/>
               </a:pPr>
-              <a:endParaRPr/>
+              <a:endParaRPr sz="1400"/>
             </a:p>
           </p:txBody>
         </p:sp>
@@ -7218,7 +7155,7 @@
                 </a:spcAft>
                 <a:buNone/>
               </a:pPr>
-              <a:endParaRPr/>
+              <a:endParaRPr sz="1400"/>
             </a:p>
           </p:txBody>
         </p:sp>
@@ -7262,7 +7199,7 @@
                 </a:spcAft>
                 <a:buNone/>
               </a:pPr>
-              <a:endParaRPr/>
+              <a:endParaRPr sz="1400"/>
             </a:p>
           </p:txBody>
         </p:sp>
@@ -7279,8 +7216,8 @@
         </p:nvSpPr>
         <p:spPr>
           <a:xfrm>
-            <a:off x="823850" y="866775"/>
-            <a:ext cx="4587000" cy="3521100"/>
+            <a:off x="823849" y="866776"/>
+            <a:ext cx="4587001" cy="3521100"/>
           </a:xfrm>
           <a:prstGeom prst="rect">
             <a:avLst/>
@@ -7408,7 +7345,7 @@
         </p:nvSpPr>
         <p:spPr>
           <a:xfrm>
-            <a:off x="8472458" y="4663217"/>
+            <a:off x="8472459" y="4663217"/>
             <a:ext cx="548700" cy="393600"/>
           </a:xfrm>
           <a:prstGeom prst="rect">
@@ -7458,20 +7395,12 @@
             </a:lvl9pPr>
           </a:lstStyle>
           <a:p>
-            <a:pPr marL="0" lvl="0" indent="0" algn="r" rtl="0">
-              <a:spcBef>
-                <a:spcPts val="0"/>
-              </a:spcBef>
-              <a:spcAft>
-                <a:spcPts val="0"/>
-              </a:spcAft>
-              <a:buNone/>
-            </a:pPr>
             <a:fld id="{00000000-1234-1234-1234-123412341234}" type="slidenum">
-              <a:rPr lang="fr"/>
+              <a:rPr lang="fr" smtClean="0"/>
+              <a:pPr/>
               <a:t>‹#›</a:t>
             </a:fld>
-            <a:endParaRPr/>
+            <a:endParaRPr lang="fr"/>
           </a:p>
         </p:txBody>
       </p:sp>
@@ -7508,8 +7437,8 @@
         </p:nvGrpSpPr>
         <p:grpSpPr>
           <a:xfrm>
-            <a:off x="0" y="381001"/>
-            <a:ext cx="1037850" cy="1016287"/>
+            <a:off x="1" y="381001"/>
+            <a:ext cx="1037851" cy="1016287"/>
             <a:chOff x="0" y="381001"/>
             <a:chExt cx="1037850" cy="1016287"/>
           </a:xfrm>
@@ -7552,7 +7481,7 @@
                 </a:spcAft>
                 <a:buNone/>
               </a:pPr>
-              <a:endParaRPr/>
+              <a:endParaRPr sz="1400"/>
             </a:p>
           </p:txBody>
         </p:sp>
@@ -7594,7 +7523,7 @@
                 </a:spcAft>
                 <a:buNone/>
               </a:pPr>
-              <a:endParaRPr/>
+              <a:endParaRPr sz="1400"/>
             </a:p>
           </p:txBody>
         </p:sp>
@@ -7611,7 +7540,7 @@
         </p:nvSpPr>
         <p:spPr>
           <a:xfrm>
-            <a:off x="1297500" y="1658325"/>
+            <a:off x="1297502" y="1658326"/>
             <a:ext cx="3036300" cy="1751700"/>
           </a:xfrm>
           <a:prstGeom prst="rect">
@@ -7740,7 +7669,7 @@
         </p:nvSpPr>
         <p:spPr>
           <a:xfrm>
-            <a:off x="1297500" y="3538000"/>
+            <a:off x="1297502" y="3538000"/>
             <a:ext cx="3036300" cy="506100"/>
           </a:xfrm>
           <a:prstGeom prst="rect">
@@ -7896,7 +7825,7 @@
         </p:nvSpPr>
         <p:spPr>
           <a:xfrm>
-            <a:off x="4648200" y="1696600"/>
+            <a:off x="4648199" y="1696600"/>
             <a:ext cx="3676800" cy="2347500"/>
           </a:xfrm>
           <a:prstGeom prst="rect">
@@ -7908,7 +7837,7 @@
             <a:noAutofit/>
           </a:bodyPr>
           <a:lstStyle>
-            <a:lvl1pPr marL="457200" lvl="0" indent="-311150">
+            <a:lvl1pPr marL="457206" lvl="0" indent="-311154">
               <a:spcBef>
                 <a:spcPts val="0"/>
               </a:spcBef>
@@ -7919,7 +7848,7 @@
               <a:buChar char="●"/>
               <a:defRPr/>
             </a:lvl1pPr>
-            <a:lvl2pPr marL="914400" lvl="1" indent="-298450">
+            <a:lvl2pPr marL="914411" lvl="1" indent="-298454">
               <a:spcBef>
                 <a:spcPts val="1600"/>
               </a:spcBef>
@@ -7930,7 +7859,7 @@
               <a:buChar char="○"/>
               <a:defRPr/>
             </a:lvl2pPr>
-            <a:lvl3pPr marL="1371600" lvl="2" indent="-298450">
+            <a:lvl3pPr marL="1371617" lvl="2" indent="-298454">
               <a:spcBef>
                 <a:spcPts val="1600"/>
               </a:spcBef>
@@ -7941,7 +7870,7 @@
               <a:buChar char="■"/>
               <a:defRPr/>
             </a:lvl3pPr>
-            <a:lvl4pPr marL="1828800" lvl="3" indent="-298450">
+            <a:lvl4pPr marL="1828823" lvl="3" indent="-298454">
               <a:spcBef>
                 <a:spcPts val="1600"/>
               </a:spcBef>
@@ -7952,7 +7881,7 @@
               <a:buChar char="●"/>
               <a:defRPr/>
             </a:lvl4pPr>
-            <a:lvl5pPr marL="2286000" lvl="4" indent="-298450">
+            <a:lvl5pPr marL="2286029" lvl="4" indent="-298454">
               <a:spcBef>
                 <a:spcPts val="1600"/>
               </a:spcBef>
@@ -7963,7 +7892,7 @@
               <a:buChar char="○"/>
               <a:defRPr/>
             </a:lvl5pPr>
-            <a:lvl6pPr marL="2743200" lvl="5" indent="-298450">
+            <a:lvl6pPr marL="2743234" lvl="5" indent="-298454">
               <a:spcBef>
                 <a:spcPts val="1600"/>
               </a:spcBef>
@@ -7974,7 +7903,7 @@
               <a:buChar char="■"/>
               <a:defRPr/>
             </a:lvl6pPr>
-            <a:lvl7pPr marL="3200400" lvl="6" indent="-298450">
+            <a:lvl7pPr marL="3200440" lvl="6" indent="-298454">
               <a:spcBef>
                 <a:spcPts val="1600"/>
               </a:spcBef>
@@ -7985,7 +7914,7 @@
               <a:buChar char="●"/>
               <a:defRPr/>
             </a:lvl7pPr>
-            <a:lvl8pPr marL="3657600" lvl="7" indent="-298450">
+            <a:lvl8pPr marL="3657646" lvl="7" indent="-298454">
               <a:spcBef>
                 <a:spcPts val="1600"/>
               </a:spcBef>
@@ -7996,7 +7925,7 @@
               <a:buChar char="○"/>
               <a:defRPr/>
             </a:lvl8pPr>
-            <a:lvl9pPr marL="4114800" lvl="8" indent="-298450">
+            <a:lvl9pPr marL="4114851" lvl="8" indent="-298454">
               <a:spcBef>
                 <a:spcPts val="1600"/>
               </a:spcBef>
@@ -8025,7 +7954,7 @@
         </p:nvSpPr>
         <p:spPr>
           <a:xfrm>
-            <a:off x="8472458" y="4663217"/>
+            <a:off x="8472459" y="4663217"/>
             <a:ext cx="548700" cy="393600"/>
           </a:xfrm>
           <a:prstGeom prst="rect">
@@ -8075,20 +8004,12 @@
             </a:lvl9pPr>
           </a:lstStyle>
           <a:p>
-            <a:pPr marL="0" lvl="0" indent="0" algn="r" rtl="0">
-              <a:spcBef>
-                <a:spcPts val="0"/>
-              </a:spcBef>
-              <a:spcAft>
-                <a:spcPts val="0"/>
-              </a:spcAft>
-              <a:buNone/>
-            </a:pPr>
             <a:fld id="{00000000-1234-1234-1234-123412341234}" type="slidenum">
-              <a:rPr lang="fr"/>
+              <a:rPr lang="fr" smtClean="0"/>
+              <a:pPr/>
               <a:t>‹#›</a:t>
             </a:fld>
-            <a:endParaRPr/>
+            <a:endParaRPr lang="fr"/>
           </a:p>
         </p:txBody>
       </p:sp>
@@ -8125,8 +8046,8 @@
         </p:nvGrpSpPr>
         <p:grpSpPr>
           <a:xfrm>
-            <a:off x="0" y="4128572"/>
-            <a:ext cx="698925" cy="684657"/>
+            <a:off x="1" y="4128572"/>
+            <a:ext cx="698924" cy="684657"/>
             <a:chOff x="0" y="3785672"/>
             <a:chExt cx="698925" cy="684657"/>
           </a:xfrm>
@@ -8171,7 +8092,7 @@
                 </a:spcAft>
                 <a:buNone/>
               </a:pPr>
-              <a:endParaRPr/>
+              <a:endParaRPr sz="1400"/>
             </a:p>
           </p:txBody>
         </p:sp>
@@ -8215,7 +8136,7 @@
                 </a:spcAft>
                 <a:buNone/>
               </a:pPr>
-              <a:endParaRPr/>
+              <a:endParaRPr sz="1400"/>
             </a:p>
           </p:txBody>
         </p:sp>
@@ -8244,7 +8165,7 @@
             <a:noAutofit/>
           </a:bodyPr>
           <a:lstStyle>
-            <a:lvl1pPr marL="457200" lvl="0" indent="-228600">
+            <a:lvl1pPr marL="457206" lvl="0" indent="-228603">
               <a:lnSpc>
                 <a:spcPct val="100000"/>
               </a:lnSpc>
@@ -8276,7 +8197,7 @@
         </p:nvSpPr>
         <p:spPr>
           <a:xfrm>
-            <a:off x="8472458" y="4663217"/>
+            <a:off x="8472459" y="4663217"/>
             <a:ext cx="548700" cy="393600"/>
           </a:xfrm>
           <a:prstGeom prst="rect">
@@ -8326,20 +8247,12 @@
             </a:lvl9pPr>
           </a:lstStyle>
           <a:p>
-            <a:pPr marL="0" lvl="0" indent="0" algn="r" rtl="0">
-              <a:spcBef>
-                <a:spcPts val="0"/>
-              </a:spcBef>
-              <a:spcAft>
-                <a:spcPts val="0"/>
-              </a:spcAft>
-              <a:buNone/>
-            </a:pPr>
             <a:fld id="{00000000-1234-1234-1234-123412341234}" type="slidenum">
-              <a:rPr lang="fr"/>
+              <a:rPr lang="fr" smtClean="0"/>
+              <a:pPr/>
               <a:t>‹#›</a:t>
             </a:fld>
-            <a:endParaRPr/>
+            <a:endParaRPr lang="fr"/>
           </a:p>
         </p:txBody>
       </p:sp>
@@ -8389,7 +8302,7 @@
         <p:spPr>
           <a:xfrm>
             <a:off x="311700" y="445025"/>
-            <a:ext cx="8520600" cy="572700"/>
+            <a:ext cx="8520601" cy="572700"/>
           </a:xfrm>
           <a:prstGeom prst="rect">
             <a:avLst/>
@@ -8630,7 +8543,7 @@
         <p:spPr>
           <a:xfrm>
             <a:off x="311700" y="1152475"/>
-            <a:ext cx="8520600" cy="3416400"/>
+            <a:ext cx="8520601" cy="3416400"/>
           </a:xfrm>
           <a:prstGeom prst="rect">
             <a:avLst/>
@@ -8897,7 +8810,7 @@
         </p:nvSpPr>
         <p:spPr>
           <a:xfrm>
-            <a:off x="8472458" y="4663217"/>
+            <a:off x="8472459" y="4663217"/>
             <a:ext cx="548700" cy="393600"/>
           </a:xfrm>
           <a:prstGeom prst="rect">
@@ -9023,20 +8936,12 @@
             </a:lvl9pPr>
           </a:lstStyle>
           <a:p>
-            <a:pPr marL="0" lvl="0" indent="0" algn="r" rtl="0">
-              <a:spcBef>
-                <a:spcPts val="0"/>
-              </a:spcBef>
-              <a:spcAft>
-                <a:spcPts val="0"/>
-              </a:spcAft>
-              <a:buNone/>
-            </a:pPr>
             <a:fld id="{00000000-1234-1234-1234-123412341234}" type="slidenum">
-              <a:rPr lang="fr"/>
+              <a:rPr lang="fr" smtClean="0"/>
+              <a:pPr/>
               <a:t>‹#›</a:t>
             </a:fld>
-            <a:endParaRPr/>
+            <a:endParaRPr lang="fr"/>
           </a:p>
         </p:txBody>
       </p:sp>
@@ -9778,7 +9683,7 @@
         </p:nvSpPr>
         <p:spPr>
           <a:xfrm>
-            <a:off x="3132850" y="1578400"/>
+            <a:off x="3132850" y="1578401"/>
             <a:ext cx="5905800" cy="1578900"/>
           </a:xfrm>
           <a:prstGeom prst="rect">
@@ -9791,17 +9696,10 @@
           </a:bodyPr>
           <a:lstStyle/>
           <a:p>
-            <a:pPr marL="0" lvl="0" indent="0" algn="l" rtl="0">
+            <a:pPr>
               <a:lnSpc>
                 <a:spcPct val="150000"/>
               </a:lnSpc>
-              <a:spcBef>
-                <a:spcPts val="0"/>
-              </a:spcBef>
-              <a:spcAft>
-                <a:spcPts val="0"/>
-              </a:spcAft>
-              <a:buNone/>
             </a:pPr>
             <a:r>
               <a:rPr lang="fr" sz="3500"/>
@@ -9810,17 +9708,10 @@
             <a:endParaRPr sz="3500"/>
           </a:p>
           <a:p>
-            <a:pPr marL="0" lvl="0" indent="0" algn="l" rtl="0">
+            <a:pPr>
               <a:lnSpc>
                 <a:spcPct val="150000"/>
               </a:lnSpc>
-              <a:spcBef>
-                <a:spcPts val="0"/>
-              </a:spcBef>
-              <a:spcAft>
-                <a:spcPts val="0"/>
-              </a:spcAft>
-              <a:buNone/>
             </a:pPr>
             <a:r>
               <a:rPr lang="fr" sz="3500"/>
@@ -9842,7 +9733,7 @@
         </p:nvSpPr>
         <p:spPr>
           <a:xfrm>
-            <a:off x="5083950" y="3924925"/>
+            <a:off x="5083951" y="3924926"/>
             <a:ext cx="3470700" cy="506100"/>
           </a:xfrm>
           <a:prstGeom prst="rect">
@@ -9855,15 +9746,7 @@
           </a:bodyPr>
           <a:lstStyle/>
           <a:p>
-            <a:pPr marL="0" lvl="0" indent="0" algn="l" rtl="0">
-              <a:spcBef>
-                <a:spcPts val="0"/>
-              </a:spcBef>
-              <a:spcAft>
-                <a:spcPts val="0"/>
-              </a:spcAft>
-              <a:buNone/>
-            </a:pPr>
+            <a:pPr marL="0" indent="0"/>
             <a:r>
               <a:rPr lang="fr"/>
               <a:t>Mohammed Fonseca | Laurent Di Dionisio</a:t>
@@ -9899,6 +9782,367 @@
           </a:ln>
         </p:spPr>
       </p:pic>
+    </p:spTree>
+  </p:cSld>
+  <p:clrMapOvr>
+    <a:masterClrMapping/>
+  </p:clrMapOvr>
+</p:sld>
+</file>
+
+<file path=ppt/slides/slide10.xml><?xml version="1.0" encoding="utf-8"?>
+<p:sld xmlns:a="http://schemas.openxmlformats.org/drawingml/2006/main" xmlns:r="http://schemas.openxmlformats.org/officeDocument/2006/relationships" xmlns:p="http://schemas.openxmlformats.org/presentationml/2006/main">
+  <p:cSld>
+    <p:spTree>
+      <p:nvGrpSpPr>
+        <p:cNvPr id="1" name="Shape 176"/>
+        <p:cNvGrpSpPr/>
+        <p:nvPr/>
+      </p:nvGrpSpPr>
+      <p:grpSpPr>
+        <a:xfrm>
+          <a:off x="0" y="0"/>
+          <a:ext cx="0" cy="0"/>
+          <a:chOff x="0" y="0"/>
+          <a:chExt cx="0" cy="0"/>
+        </a:xfrm>
+      </p:grpSpPr>
+      <p:sp>
+        <p:nvSpPr>
+          <p:cNvPr id="177" name="Google Shape;177;p20"/>
+          <p:cNvSpPr txBox="1">
+            <a:spLocks noGrp="1"/>
+          </p:cNvSpPr>
+          <p:nvPr>
+            <p:ph type="title"/>
+          </p:nvPr>
+        </p:nvSpPr>
+        <p:spPr>
+          <a:xfrm>
+            <a:off x="1297500" y="393750"/>
+            <a:ext cx="7038900" cy="914100"/>
+          </a:xfrm>
+          <a:prstGeom prst="rect">
+            <a:avLst/>
+          </a:prstGeom>
+        </p:spPr>
+        <p:txBody>
+          <a:bodyPr spcFirstLastPara="1" wrap="square" lIns="91425" tIns="91425" rIns="91425" bIns="91425" anchor="t" anchorCtr="0">
+            <a:noAutofit/>
+          </a:bodyPr>
+          <a:lstStyle/>
+          <a:p>
+            <a:r>
+              <a:rPr lang="fr"/>
+              <a:t>Historique</a:t>
+            </a:r>
+            <a:endParaRPr/>
+          </a:p>
+        </p:txBody>
+      </p:sp>
+      <p:sp>
+        <p:nvSpPr>
+          <p:cNvPr id="178" name="Google Shape;178;p20"/>
+          <p:cNvSpPr txBox="1">
+            <a:spLocks noGrp="1"/>
+          </p:cNvSpPr>
+          <p:nvPr>
+            <p:ph type="body" idx="1"/>
+          </p:nvPr>
+        </p:nvSpPr>
+        <p:spPr>
+          <a:xfrm>
+            <a:off x="1297500" y="1567550"/>
+            <a:ext cx="7038900" cy="2911200"/>
+          </a:xfrm>
+          <a:prstGeom prst="rect">
+            <a:avLst/>
+          </a:prstGeom>
+        </p:spPr>
+        <p:txBody>
+          <a:bodyPr spcFirstLastPara="1" wrap="square" lIns="91425" tIns="91425" rIns="91425" bIns="91425" anchor="t" anchorCtr="0">
+            <a:noAutofit/>
+          </a:bodyPr>
+          <a:lstStyle/>
+          <a:p>
+            <a:r>
+              <a:rPr lang="fr" dirty="0"/>
+              <a:t>La liste des produits recherchés par le passé apparaît sous la forme d’une liste.</a:t>
+            </a:r>
+          </a:p>
+          <a:p>
+            <a:endParaRPr lang="fr" dirty="0"/>
+          </a:p>
+          <a:p>
+            <a:r>
+              <a:rPr lang="fr" dirty="0"/>
+              <a:t>RecyclerView</a:t>
+            </a:r>
+            <a:endParaRPr dirty="0"/>
+          </a:p>
+          <a:p>
+            <a:pPr lvl="1">
+              <a:spcBef>
+                <a:spcPts val="0"/>
+              </a:spcBef>
+            </a:pPr>
+            <a:r>
+              <a:rPr lang="fr-FR" dirty="0"/>
+              <a:t>Adapter : Permet de faire la liaison entre la vue </a:t>
+            </a:r>
+            <a:r>
+              <a:rPr lang="fr-FR" dirty="0" err="1"/>
+              <a:t>RecyclerView</a:t>
+            </a:r>
+            <a:r>
+              <a:rPr lang="fr-FR" dirty="0"/>
+              <a:t> et la liste de données, </a:t>
+            </a:r>
+            <a:r>
+              <a:rPr lang="en-GB" dirty="0" err="1"/>
+              <a:t>crée</a:t>
+            </a:r>
+            <a:r>
+              <a:rPr lang="en-GB" dirty="0"/>
+              <a:t> et </a:t>
+            </a:r>
+            <a:r>
+              <a:rPr lang="en-GB" dirty="0" err="1"/>
+              <a:t>réutilise</a:t>
+            </a:r>
+            <a:r>
+              <a:rPr lang="en-GB" dirty="0"/>
+              <a:t> le(s) </a:t>
+            </a:r>
+            <a:r>
+              <a:rPr lang="en-GB" dirty="0" err="1"/>
+              <a:t>ViewHolder</a:t>
+            </a:r>
+            <a:r>
+              <a:rPr lang="en-GB" dirty="0"/>
+              <a:t>(s) qui </a:t>
+            </a:r>
+            <a:r>
+              <a:rPr lang="en-GB" dirty="0" err="1"/>
+              <a:t>vont</a:t>
+            </a:r>
+            <a:r>
+              <a:rPr lang="en-GB" dirty="0"/>
+              <a:t> </a:t>
+            </a:r>
+            <a:r>
+              <a:rPr lang="en-GB" dirty="0" err="1"/>
+              <a:t>être</a:t>
+            </a:r>
+            <a:r>
+              <a:rPr lang="en-GB" dirty="0"/>
+              <a:t> </a:t>
+            </a:r>
+            <a:r>
+              <a:rPr lang="en-GB" dirty="0" err="1"/>
+              <a:t>nécessaires</a:t>
+            </a:r>
+            <a:r>
+              <a:rPr lang="en-GB" dirty="0"/>
+              <a:t> pour </a:t>
+            </a:r>
+            <a:r>
+              <a:rPr lang="en-GB" dirty="0" err="1"/>
+              <a:t>afficher</a:t>
+            </a:r>
+            <a:r>
+              <a:rPr lang="en-GB" dirty="0"/>
+              <a:t> les </a:t>
+            </a:r>
+            <a:r>
+              <a:rPr lang="en-GB" dirty="0" err="1"/>
+              <a:t>données</a:t>
+            </a:r>
+            <a:r>
+              <a:rPr lang="en-GB" dirty="0"/>
+              <a:t> </a:t>
+            </a:r>
+            <a:r>
+              <a:rPr lang="en-GB" dirty="0" err="1"/>
+              <a:t>en</a:t>
+            </a:r>
+            <a:r>
+              <a:rPr lang="en-GB" dirty="0"/>
+              <a:t> function de </a:t>
+            </a:r>
+            <a:r>
+              <a:rPr lang="en-GB" dirty="0" err="1"/>
+              <a:t>leur</a:t>
+            </a:r>
+            <a:r>
+              <a:rPr lang="en-GB" dirty="0"/>
+              <a:t> position dans la </a:t>
+            </a:r>
+            <a:r>
+              <a:rPr lang="en-GB" dirty="0" err="1"/>
+              <a:t>liste</a:t>
+            </a:r>
+            <a:r>
+              <a:rPr lang="en-GB" dirty="0"/>
+              <a:t>.</a:t>
+            </a:r>
+          </a:p>
+          <a:p>
+            <a:pPr lvl="1">
+              <a:spcBef>
+                <a:spcPts val="0"/>
+              </a:spcBef>
+            </a:pPr>
+            <a:endParaRPr lang="fr-FR" dirty="0"/>
+          </a:p>
+          <a:p>
+            <a:pPr lvl="1">
+              <a:spcBef>
+                <a:spcPts val="0"/>
+              </a:spcBef>
+            </a:pPr>
+            <a:r>
+              <a:rPr lang="fr-FR" dirty="0" err="1"/>
+              <a:t>ViewHolder</a:t>
+            </a:r>
+            <a:r>
+              <a:rPr lang="fr-FR" dirty="0"/>
+              <a:t> : Permet de représenter visuellement un élément de la liste de données dans le </a:t>
+            </a:r>
+            <a:r>
+              <a:rPr lang="fr-FR" dirty="0" err="1"/>
+              <a:t>RecyclerView</a:t>
+            </a:r>
+            <a:r>
+              <a:rPr lang="fr-FR" dirty="0"/>
+              <a:t> (une ligne).</a:t>
+            </a:r>
+          </a:p>
+          <a:p>
+            <a:pPr lvl="1">
+              <a:spcBef>
+                <a:spcPts val="0"/>
+              </a:spcBef>
+            </a:pPr>
+            <a:endParaRPr lang="fr-FR" dirty="0"/>
+          </a:p>
+          <a:p>
+            <a:pPr lvl="1">
+              <a:spcBef>
+                <a:spcPts val="0"/>
+              </a:spcBef>
+            </a:pPr>
+            <a:r>
+              <a:rPr lang="en-GB" dirty="0"/>
+              <a:t>Layout : </a:t>
+            </a:r>
+            <a:r>
+              <a:rPr lang="en-GB" dirty="0" err="1"/>
+              <a:t>définit</a:t>
+            </a:r>
+            <a:r>
+              <a:rPr lang="en-GB" dirty="0"/>
+              <a:t> comment </a:t>
+            </a:r>
+            <a:r>
+              <a:rPr lang="en-GB" dirty="0" err="1"/>
+              <a:t>afficher</a:t>
+            </a:r>
+            <a:r>
+              <a:rPr lang="en-GB" dirty="0"/>
+              <a:t> </a:t>
+            </a:r>
+            <a:r>
+              <a:rPr lang="en-GB" dirty="0" err="1"/>
+              <a:t>chaque</a:t>
+            </a:r>
+            <a:r>
+              <a:rPr lang="en-GB" dirty="0"/>
+              <a:t> </a:t>
+            </a:r>
+            <a:r>
+              <a:rPr lang="en-GB" dirty="0" err="1"/>
+              <a:t>élément</a:t>
+            </a:r>
+            <a:r>
+              <a:rPr lang="en-GB" dirty="0"/>
+              <a:t>  du </a:t>
+            </a:r>
+            <a:r>
+              <a:rPr lang="en-GB" dirty="0" err="1"/>
+              <a:t>RecyclerView</a:t>
+            </a:r>
+            <a:r>
+              <a:rPr lang="en-GB" dirty="0"/>
+              <a:t>.</a:t>
+            </a:r>
+          </a:p>
+          <a:p>
+            <a:pPr lvl="1">
+              <a:spcBef>
+                <a:spcPts val="0"/>
+              </a:spcBef>
+            </a:pPr>
+            <a:endParaRPr lang="en-GB" dirty="0"/>
+          </a:p>
+          <a:p>
+            <a:pPr lvl="1">
+              <a:spcBef>
+                <a:spcPts val="0"/>
+              </a:spcBef>
+            </a:pPr>
+            <a:r>
+              <a:rPr lang="en-GB" dirty="0" err="1"/>
+              <a:t>LayoutManager</a:t>
+            </a:r>
+            <a:r>
+              <a:rPr lang="en-GB" dirty="0"/>
+              <a:t> : </a:t>
+            </a:r>
+            <a:r>
+              <a:rPr lang="en-GB" dirty="0" err="1"/>
+              <a:t>Définit</a:t>
+            </a:r>
+            <a:r>
+              <a:rPr lang="en-GB" dirty="0"/>
+              <a:t> </a:t>
+            </a:r>
+            <a:r>
+              <a:rPr lang="en-GB" dirty="0" err="1"/>
+              <a:t>l’arrangement</a:t>
+            </a:r>
+            <a:r>
+              <a:rPr lang="en-GB" dirty="0"/>
+              <a:t> de </a:t>
+            </a:r>
+            <a:r>
+              <a:rPr lang="en-GB" dirty="0" err="1"/>
+              <a:t>tous</a:t>
+            </a:r>
+            <a:r>
+              <a:rPr lang="en-GB" dirty="0"/>
+              <a:t> les </a:t>
+            </a:r>
+            <a:r>
+              <a:rPr lang="en-GB" dirty="0" err="1"/>
+              <a:t>éléments</a:t>
+            </a:r>
+            <a:r>
+              <a:rPr lang="en-GB" dirty="0"/>
+              <a:t> dans le </a:t>
+            </a:r>
+            <a:r>
+              <a:rPr lang="en-GB" dirty="0" err="1"/>
+              <a:t>RecyclerView</a:t>
+            </a:r>
+            <a:r>
+              <a:rPr lang="en-GB" dirty="0"/>
+              <a:t>.</a:t>
+            </a:r>
+            <a:endParaRPr lang="fr-FR" dirty="0"/>
+          </a:p>
+        </p:txBody>
+      </p:sp>
     </p:spTree>
   </p:cSld>
   <p:clrMapOvr>
@@ -9949,15 +10193,6 @@
           </a:bodyPr>
           <a:lstStyle/>
           <a:p>
-            <a:pPr marL="0" lvl="0" indent="0" algn="l" rtl="0">
-              <a:spcBef>
-                <a:spcPts val="0"/>
-              </a:spcBef>
-              <a:spcAft>
-                <a:spcPts val="0"/>
-              </a:spcAft>
-              <a:buNone/>
-            </a:pPr>
             <a:r>
               <a:rPr lang="fr"/>
               <a:t>Présentation générale de l’application</a:t>
@@ -9991,23 +10226,26 @@
           </a:bodyPr>
           <a:lstStyle/>
           <a:p>
-            <a:pPr marL="457200" lvl="0" indent="-311150" algn="l" rtl="0">
-              <a:spcBef>
-                <a:spcPts val="0"/>
-              </a:spcBef>
-              <a:spcAft>
-                <a:spcPts val="0"/>
-              </a:spcAft>
+            <a:r>
+              <a:rPr lang="fr" dirty="0"/>
+              <a:t>L’application implémente les fonctionnalités suivantes :</a:t>
+            </a:r>
+          </a:p>
+          <a:p>
+            <a:pPr lvl="1" indent="-311154">
+              <a:spcBef>
+                <a:spcPts val="0"/>
+              </a:spcBef>
               <a:buSzPts val="1300"/>
               <a:buChar char="●"/>
             </a:pPr>
             <a:r>
               <a:rPr lang="fr" dirty="0"/>
-              <a:t>L’application implémente les fonctionnalités suivantes :</a:t>
-            </a:r>
-          </a:p>
-          <a:p>
-            <a:pPr lvl="1" indent="-311150">
+              <a:t>Scan du code bar d’un produit alimentaire via la caméra du terminal mobile</a:t>
+            </a:r>
+          </a:p>
+          <a:p>
+            <a:pPr lvl="1" indent="-311154">
               <a:spcBef>
                 <a:spcPts val="0"/>
               </a:spcBef>
@@ -10016,11 +10254,11 @@
             </a:pPr>
             <a:r>
               <a:rPr lang="fr" dirty="0"/>
-              <a:t>Scan du code bar d’un produit alimentaire via la caméra du terminal mobile</a:t>
-            </a:r>
-          </a:p>
-          <a:p>
-            <a:pPr lvl="1" indent="-311150">
+              <a:t>Saisie manuelle du code bar</a:t>
+            </a:r>
+          </a:p>
+          <a:p>
+            <a:pPr lvl="1" indent="-311154">
               <a:spcBef>
                 <a:spcPts val="0"/>
               </a:spcBef>
@@ -10029,11 +10267,11 @@
             </a:pPr>
             <a:r>
               <a:rPr lang="fr" dirty="0"/>
-              <a:t>Saisie manuelle du code bar</a:t>
-            </a:r>
-          </a:p>
-          <a:p>
-            <a:pPr lvl="1" indent="-311150">
+              <a:t>Recherche et affichage des informations relatives au produit (photo, nom, ingrédients, valeur nutritionnelle)</a:t>
+            </a:r>
+          </a:p>
+          <a:p>
+            <a:pPr lvl="1" indent="-311154">
               <a:spcBef>
                 <a:spcPts val="0"/>
               </a:spcBef>
@@ -10042,11 +10280,11 @@
             </a:pPr>
             <a:r>
               <a:rPr lang="fr" dirty="0"/>
-              <a:t>Recherche et affichage des informations relatives au produit (photo, nom, ingrédients, valeur nutritionnelle)</a:t>
-            </a:r>
-          </a:p>
-          <a:p>
-            <a:pPr lvl="1" indent="-311150">
+              <a:t>Historique de recherche sous forme de liste de produits</a:t>
+            </a:r>
+          </a:p>
+          <a:p>
+            <a:pPr lvl="1" indent="-311154">
               <a:spcBef>
                 <a:spcPts val="0"/>
               </a:spcBef>
@@ -10055,24 +10293,11 @@
             </a:pPr>
             <a:r>
               <a:rPr lang="fr" dirty="0"/>
-              <a:t>Historique de recherche sous forme de liste de produits</a:t>
-            </a:r>
-          </a:p>
-          <a:p>
-            <a:pPr lvl="1" indent="-311150">
-              <a:spcBef>
-                <a:spcPts val="0"/>
-              </a:spcBef>
-              <a:buSzPts val="1300"/>
-              <a:buChar char="●"/>
-            </a:pPr>
-            <a:r>
-              <a:rPr lang="fr" dirty="0"/>
               <a:t>Suppression d’un produit de l’historique en swipant horizontalement</a:t>
             </a:r>
           </a:p>
           <a:p>
-            <a:pPr lvl="1" indent="-311150">
+            <a:pPr lvl="1" indent="-311154">
               <a:spcBef>
                 <a:spcPts val="0"/>
               </a:spcBef>
@@ -10155,7 +10380,7 @@
             <a:endParaRPr lang="fr" dirty="0"/>
           </a:p>
           <a:p>
-            <a:pPr lvl="1" indent="-311150">
+            <a:pPr lvl="1" indent="-311154">
               <a:spcBef>
                 <a:spcPts val="0"/>
               </a:spcBef>
@@ -10168,7 +10393,7 @@
             </a:r>
           </a:p>
           <a:p>
-            <a:pPr lvl="1" indent="-311150">
+            <a:pPr lvl="1" indent="-311154">
               <a:spcBef>
                 <a:spcPts val="0"/>
               </a:spcBef>
@@ -10181,7 +10406,7 @@
             </a:r>
           </a:p>
           <a:p>
-            <a:pPr marL="603250" lvl="1" indent="0">
+            <a:pPr marL="603258" lvl="1" indent="0">
               <a:spcBef>
                 <a:spcPts val="0"/>
               </a:spcBef>
@@ -10191,16 +10416,6 @@
             <a:endParaRPr lang="fr" dirty="0"/>
           </a:p>
           <a:p>
-            <a:pPr marL="457200" lvl="0" indent="-311150" algn="l" rtl="0">
-              <a:spcBef>
-                <a:spcPts val="0"/>
-              </a:spcBef>
-              <a:spcAft>
-                <a:spcPts val="0"/>
-              </a:spcAft>
-              <a:buSzPts val="1300"/>
-              <a:buChar char="●"/>
-            </a:pPr>
             <a:r>
               <a:rPr lang="fr" dirty="0"/>
               <a:t>Les informations relatives aux produits sont fournies par l’API </a:t>
@@ -10214,16 +10429,6 @@
             <a:endParaRPr lang="en-GB" dirty="0"/>
           </a:p>
           <a:p>
-            <a:pPr marL="457200" lvl="0" indent="-311150" algn="l" rtl="0">
-              <a:spcBef>
-                <a:spcPts val="0"/>
-              </a:spcBef>
-              <a:spcAft>
-                <a:spcPts val="0"/>
-              </a:spcAft>
-              <a:buSzPts val="1300"/>
-              <a:buChar char="●"/>
-            </a:pPr>
             <a:endParaRPr dirty="0"/>
           </a:p>
         </p:txBody>
@@ -10278,15 +10483,6 @@
           </a:bodyPr>
           <a:lstStyle/>
           <a:p>
-            <a:pPr marL="0" lvl="0" indent="0" algn="l" rtl="0">
-              <a:spcBef>
-                <a:spcPts val="0"/>
-              </a:spcBef>
-              <a:spcAft>
-                <a:spcPts val="0"/>
-              </a:spcAft>
-              <a:buNone/>
-            </a:pPr>
             <a:r>
               <a:rPr lang="fr"/>
               <a:t>Architecture générale</a:t>
@@ -10307,7 +10503,7 @@
         </p:nvSpPr>
         <p:spPr>
           <a:xfrm>
-            <a:off x="1297500" y="1190847"/>
+            <a:off x="1297500" y="1190848"/>
             <a:ext cx="7038900" cy="3287903"/>
           </a:xfrm>
           <a:prstGeom prst="rect">
@@ -10350,7 +10546,7 @@
             </a:r>
           </a:p>
           <a:p>
-            <a:pPr lvl="1" indent="-311150">
+            <a:pPr lvl="1" indent="-311154">
               <a:spcBef>
                 <a:spcPts val="0"/>
               </a:spcBef>
@@ -10379,7 +10575,7 @@
             </a:r>
           </a:p>
           <a:p>
-            <a:pPr lvl="1" indent="-311150">
+            <a:pPr lvl="1" indent="-311154">
               <a:spcBef>
                 <a:spcPts val="0"/>
               </a:spcBef>
@@ -10400,7 +10596,7 @@
             </a:r>
           </a:p>
           <a:p>
-            <a:pPr lvl="1" indent="-311150">
+            <a:pPr lvl="1" indent="-311154">
               <a:spcBef>
                 <a:spcPts val="0"/>
               </a:spcBef>
@@ -10493,7 +10689,7 @@
             </a:r>
           </a:p>
           <a:p>
-            <a:pPr lvl="1" indent="-311150">
+            <a:pPr lvl="1" indent="-311154">
               <a:spcBef>
                 <a:spcPts val="0"/>
               </a:spcBef>
@@ -10594,7 +10790,7 @@
             </a:r>
           </a:p>
           <a:p>
-            <a:pPr lvl="1" indent="-311150">
+            <a:pPr lvl="1" indent="-311154">
               <a:spcBef>
                 <a:spcPts val="0"/>
               </a:spcBef>
@@ -10721,7 +10917,7 @@
             </a:r>
           </a:p>
           <a:p>
-            <a:pPr lvl="1" indent="-311150">
+            <a:pPr lvl="1" indent="-311154">
               <a:spcBef>
                 <a:spcPts val="0"/>
               </a:spcBef>
@@ -10750,7 +10946,7 @@
             </a:r>
           </a:p>
           <a:p>
-            <a:pPr lvl="1" indent="-311150">
+            <a:pPr lvl="1" indent="-311154">
               <a:spcBef>
                 <a:spcPts val="0"/>
               </a:spcBef>
@@ -10805,7 +11001,7 @@
         </p:nvSpPr>
         <p:spPr>
           <a:xfrm>
-            <a:off x="2199539" y="4806457"/>
+            <a:off x="2199540" y="4806458"/>
             <a:ext cx="5509065" cy="246221"/>
           </a:xfrm>
           <a:prstGeom prst="rect">
@@ -10891,15 +11087,6 @@
           </a:bodyPr>
           <a:lstStyle/>
           <a:p>
-            <a:pPr marL="0" lvl="0" indent="0" algn="l" rtl="0">
-              <a:spcBef>
-                <a:spcPts val="0"/>
-              </a:spcBef>
-              <a:spcAft>
-                <a:spcPts val="0"/>
-              </a:spcAft>
-              <a:buNone/>
-            </a:pPr>
             <a:r>
               <a:rPr lang="fr" dirty="0"/>
               <a:t>Architecture générale</a:t>
@@ -10933,132 +11120,184 @@
           </a:bodyPr>
           <a:lstStyle/>
           <a:p>
-            <a:pPr marL="457200" lvl="0" indent="-311150" algn="l" rtl="0">
-              <a:spcBef>
-                <a:spcPts val="0"/>
-              </a:spcBef>
-              <a:spcAft>
-                <a:spcPts val="0"/>
-              </a:spcAft>
+            <a:r>
+              <a:rPr lang="en-GB" sz="1200" dirty="0"/>
+              <a:t>Les fragments </a:t>
+            </a:r>
+            <a:r>
+              <a:rPr lang="en-GB" sz="1200" dirty="0" err="1"/>
+              <a:t>possèdent</a:t>
+            </a:r>
+            <a:r>
+              <a:rPr lang="en-GB" sz="1200" dirty="0"/>
+              <a:t> </a:t>
+            </a:r>
+            <a:r>
+              <a:rPr lang="en-GB" sz="1200" dirty="0" err="1"/>
+              <a:t>une</a:t>
+            </a:r>
+            <a:r>
+              <a:rPr lang="en-GB" sz="1200" dirty="0"/>
+              <a:t> reference </a:t>
+            </a:r>
+            <a:r>
+              <a:rPr lang="en-GB" sz="1200" dirty="0" err="1"/>
+              <a:t>vers</a:t>
+            </a:r>
+            <a:r>
+              <a:rPr lang="en-GB" sz="1200" dirty="0"/>
+              <a:t> les </a:t>
+            </a:r>
+            <a:r>
+              <a:rPr lang="en-GB" sz="1200" dirty="0" err="1"/>
+              <a:t>ViewModels</a:t>
+            </a:r>
+            <a:r>
+              <a:rPr lang="en-GB" sz="1200" dirty="0"/>
+              <a:t>. </a:t>
+            </a:r>
+          </a:p>
+          <a:p>
+            <a:r>
+              <a:rPr lang="en-GB" sz="1200" dirty="0"/>
+              <a:t>Les </a:t>
+            </a:r>
+            <a:r>
+              <a:rPr lang="en-GB" sz="1200" dirty="0" err="1"/>
+              <a:t>ViewModels</a:t>
+            </a:r>
+            <a:r>
+              <a:rPr lang="en-GB" sz="1200" dirty="0"/>
+              <a:t> </a:t>
+            </a:r>
+            <a:r>
+              <a:rPr lang="en-GB" sz="1200" dirty="0" err="1"/>
+              <a:t>possèdent</a:t>
+            </a:r>
+            <a:r>
+              <a:rPr lang="en-GB" sz="1200" dirty="0"/>
+              <a:t> </a:t>
+            </a:r>
+            <a:r>
+              <a:rPr lang="en-GB" sz="1200" dirty="0" err="1"/>
+              <a:t>une</a:t>
+            </a:r>
+            <a:r>
+              <a:rPr lang="en-GB" sz="1200" dirty="0"/>
+              <a:t> reference </a:t>
+            </a:r>
+            <a:r>
+              <a:rPr lang="en-GB" sz="1200" dirty="0" err="1"/>
+              <a:t>vers</a:t>
+            </a:r>
+            <a:r>
+              <a:rPr lang="en-GB" sz="1200" dirty="0"/>
+              <a:t> le Repository.</a:t>
+            </a:r>
+          </a:p>
+          <a:p>
+            <a:endParaRPr lang="en-GB" dirty="0"/>
+          </a:p>
+          <a:p>
+            <a:r>
+              <a:rPr lang="fr-FR" sz="1200" dirty="0"/>
+              <a:t>Fragments : </a:t>
+            </a:r>
+          </a:p>
+          <a:p>
+            <a:pPr lvl="1" indent="-311154">
+              <a:spcBef>
+                <a:spcPts val="0"/>
+              </a:spcBef>
               <a:buSzPts val="1300"/>
               <a:buChar char="●"/>
             </a:pPr>
             <a:r>
-              <a:rPr lang="en-GB" sz="1200" dirty="0"/>
-              <a:t>Les fragments </a:t>
-            </a:r>
-            <a:r>
-              <a:rPr lang="en-GB" sz="1200" dirty="0" err="1"/>
-              <a:t>possèdent</a:t>
-            </a:r>
-            <a:r>
-              <a:rPr lang="en-GB" sz="1200" dirty="0"/>
-              <a:t> </a:t>
-            </a:r>
-            <a:r>
-              <a:rPr lang="en-GB" sz="1200" dirty="0" err="1"/>
-              <a:t>une</a:t>
-            </a:r>
-            <a:r>
-              <a:rPr lang="en-GB" sz="1200" dirty="0"/>
-              <a:t> reference </a:t>
-            </a:r>
-            <a:r>
-              <a:rPr lang="en-GB" sz="1200" dirty="0" err="1"/>
-              <a:t>vers</a:t>
-            </a:r>
-            <a:r>
-              <a:rPr lang="en-GB" sz="1200" dirty="0"/>
-              <a:t> les </a:t>
-            </a:r>
-            <a:r>
-              <a:rPr lang="en-GB" sz="1200" dirty="0" err="1"/>
-              <a:t>ViewModels</a:t>
-            </a:r>
-            <a:r>
-              <a:rPr lang="en-GB" sz="1200" dirty="0"/>
-              <a:t>. </a:t>
-            </a:r>
-          </a:p>
-          <a:p>
-            <a:pPr marL="457200" lvl="0" indent="-311150" algn="l" rtl="0">
-              <a:spcBef>
-                <a:spcPts val="0"/>
-              </a:spcBef>
-              <a:spcAft>
-                <a:spcPts val="0"/>
-              </a:spcAft>
+              <a:rPr lang="fr-FR" sz="1000" dirty="0"/>
+              <a:t>génèrent les vues </a:t>
+            </a:r>
+          </a:p>
+          <a:p>
+            <a:pPr lvl="1" indent="-311154">
+              <a:spcBef>
+                <a:spcPts val="0"/>
+              </a:spcBef>
               <a:buSzPts val="1300"/>
               <a:buChar char="●"/>
             </a:pPr>
             <a:r>
-              <a:rPr lang="en-GB" sz="1200" dirty="0"/>
-              <a:t>Les </a:t>
-            </a:r>
-            <a:r>
-              <a:rPr lang="en-GB" sz="1200" dirty="0" err="1"/>
+              <a:rPr lang="fr-FR" sz="1000" dirty="0"/>
+              <a:t>capturent les entrées utilisateur</a:t>
+            </a:r>
+          </a:p>
+          <a:p>
+            <a:pPr marL="603258" lvl="1" indent="0">
+              <a:spcBef>
+                <a:spcPts val="0"/>
+              </a:spcBef>
+              <a:buSzPts val="1300"/>
+              <a:buNone/>
+            </a:pPr>
+            <a:endParaRPr lang="fr-FR" sz="1000" dirty="0"/>
+          </a:p>
+          <a:p>
+            <a:r>
+              <a:rPr lang="fr-FR" sz="1200" dirty="0" err="1"/>
               <a:t>ViewModels</a:t>
             </a:r>
             <a:r>
-              <a:rPr lang="en-GB" sz="1200" dirty="0"/>
-              <a:t> </a:t>
-            </a:r>
-            <a:r>
-              <a:rPr lang="en-GB" sz="1200" dirty="0" err="1"/>
-              <a:t>possèdent</a:t>
-            </a:r>
-            <a:r>
-              <a:rPr lang="en-GB" sz="1200" dirty="0"/>
-              <a:t> </a:t>
-            </a:r>
-            <a:r>
-              <a:rPr lang="en-GB" sz="1200" dirty="0" err="1"/>
-              <a:t>une</a:t>
-            </a:r>
-            <a:r>
-              <a:rPr lang="en-GB" sz="1200" dirty="0"/>
-              <a:t> reference </a:t>
-            </a:r>
-            <a:r>
-              <a:rPr lang="en-GB" sz="1200" dirty="0" err="1"/>
-              <a:t>vers</a:t>
-            </a:r>
-            <a:r>
-              <a:rPr lang="en-GB" sz="1200" dirty="0"/>
-              <a:t> le Repository.</a:t>
-            </a:r>
-          </a:p>
-          <a:p>
-            <a:pPr marL="457200" lvl="0" indent="-311150" algn="l" rtl="0">
-              <a:spcBef>
-                <a:spcPts val="0"/>
-              </a:spcBef>
-              <a:spcAft>
-                <a:spcPts val="0"/>
-              </a:spcAft>
+              <a:rPr lang="fr-FR" sz="1200" dirty="0"/>
+              <a:t> : </a:t>
+            </a:r>
+          </a:p>
+          <a:p>
+            <a:pPr lvl="1" indent="-311154">
+              <a:spcBef>
+                <a:spcPts val="0"/>
+              </a:spcBef>
               <a:buSzPts val="1300"/>
               <a:buChar char="●"/>
             </a:pPr>
-            <a:endParaRPr lang="en-GB" dirty="0"/>
-          </a:p>
-          <a:p>
-            <a:pPr marL="457200" lvl="0" indent="-311150" algn="l" rtl="0">
-              <a:spcBef>
-                <a:spcPts val="0"/>
-              </a:spcBef>
-              <a:spcAft>
-                <a:spcPts val="0"/>
-              </a:spcAft>
+            <a:r>
+              <a:rPr lang="fr-FR" sz="1000" dirty="0"/>
+              <a:t>gèrent les données à afficher </a:t>
+            </a:r>
+          </a:p>
+          <a:p>
+            <a:pPr lvl="1" indent="-311154">
+              <a:spcBef>
+                <a:spcPts val="0"/>
+              </a:spcBef>
               <a:buSzPts val="1300"/>
               <a:buChar char="●"/>
             </a:pPr>
             <a:r>
+              <a:rPr lang="fr-FR" sz="1000" dirty="0"/>
+              <a:t>contiennent la logique métier</a:t>
+            </a:r>
+          </a:p>
+          <a:p>
+            <a:pPr marL="603258" lvl="1" indent="0">
+              <a:spcBef>
+                <a:spcPts val="0"/>
+              </a:spcBef>
+              <a:buSzPts val="1300"/>
+              <a:buNone/>
+            </a:pPr>
+            <a:endParaRPr lang="fr-FR" sz="1000" dirty="0"/>
+          </a:p>
+          <a:p>
+            <a:r>
+              <a:rPr lang="fr-FR" sz="1200" dirty="0" err="1"/>
+              <a:t>LiveData</a:t>
+            </a:r>
+            <a:r>
               <a:rPr lang="fr-FR" sz="1200" dirty="0"/>
-              <a:t>Fragments : </a:t>
-            </a:r>
-          </a:p>
-          <a:p>
-            <a:pPr lvl="1" indent="-311150">
+              <a:t> </a:t>
+            </a:r>
+          </a:p>
+          <a:p>
+            <a:pPr lvl="1" indent="-311154">
               <a:spcBef>
                 <a:spcPts val="0"/>
               </a:spcBef>
@@ -11067,11 +11306,23 @@
             </a:pPr>
             <a:r>
               <a:rPr lang="fr-FR" sz="1000" dirty="0"/>
-              <a:t>génèrent les vues </a:t>
-            </a:r>
-          </a:p>
-          <a:p>
-            <a:pPr lvl="1" indent="-311150">
+              <a:t>Observable : sujet qui notifie l’observer (le fragment) quand les données </a:t>
+            </a:r>
+            <a:br>
+              <a:rPr lang="fr-FR" sz="1000" dirty="0"/>
+            </a:br>
+            <a:r>
+              <a:rPr lang="fr-FR" sz="1000" dirty="0"/>
+              <a:t>ont changé dans le </a:t>
+            </a:r>
+            <a:r>
+              <a:rPr lang="fr-FR" sz="1000" dirty="0" err="1"/>
+              <a:t>ViewModel</a:t>
+            </a:r>
+            <a:endParaRPr lang="fr-FR" sz="1000" dirty="0"/>
+          </a:p>
+          <a:p>
+            <a:pPr lvl="1" indent="-311154">
               <a:spcBef>
                 <a:spcPts val="0"/>
               </a:spcBef>
@@ -11080,130 +11331,6 @@
             </a:pPr>
             <a:r>
               <a:rPr lang="fr-FR" sz="1000" dirty="0"/>
-              <a:t>capturent les entrées utilisateur</a:t>
-            </a:r>
-          </a:p>
-          <a:p>
-            <a:pPr marL="603250" lvl="1" indent="0">
-              <a:spcBef>
-                <a:spcPts val="0"/>
-              </a:spcBef>
-              <a:buSzPts val="1300"/>
-              <a:buNone/>
-            </a:pPr>
-            <a:endParaRPr lang="fr-FR" sz="1000" dirty="0"/>
-          </a:p>
-          <a:p>
-            <a:pPr marL="457200" lvl="0" indent="-311150" algn="l" rtl="0">
-              <a:spcBef>
-                <a:spcPts val="0"/>
-              </a:spcBef>
-              <a:spcAft>
-                <a:spcPts val="0"/>
-              </a:spcAft>
-              <a:buSzPts val="1300"/>
-              <a:buChar char="●"/>
-            </a:pPr>
-            <a:r>
-              <a:rPr lang="fr-FR" sz="1200" dirty="0" err="1"/>
-              <a:t>ViewModels</a:t>
-            </a:r>
-            <a:r>
-              <a:rPr lang="fr-FR" sz="1200" dirty="0"/>
-              <a:t> : </a:t>
-            </a:r>
-          </a:p>
-          <a:p>
-            <a:pPr lvl="1" indent="-311150">
-              <a:spcBef>
-                <a:spcPts val="0"/>
-              </a:spcBef>
-              <a:buSzPts val="1300"/>
-              <a:buChar char="●"/>
-            </a:pPr>
-            <a:r>
-              <a:rPr lang="fr-FR" sz="1000" dirty="0"/>
-              <a:t>gèrent les données à afficher </a:t>
-            </a:r>
-          </a:p>
-          <a:p>
-            <a:pPr lvl="1" indent="-311150">
-              <a:spcBef>
-                <a:spcPts val="0"/>
-              </a:spcBef>
-              <a:buSzPts val="1300"/>
-              <a:buChar char="●"/>
-            </a:pPr>
-            <a:r>
-              <a:rPr lang="fr-FR" sz="1000" dirty="0"/>
-              <a:t>contiennent la logique métier</a:t>
-            </a:r>
-          </a:p>
-          <a:p>
-            <a:pPr marL="603250" lvl="1" indent="0">
-              <a:spcBef>
-                <a:spcPts val="0"/>
-              </a:spcBef>
-              <a:buSzPts val="1300"/>
-              <a:buNone/>
-            </a:pPr>
-            <a:endParaRPr lang="fr-FR" sz="1000" dirty="0"/>
-          </a:p>
-          <a:p>
-            <a:pPr marL="457200" lvl="0" indent="-311150" algn="l" rtl="0">
-              <a:spcBef>
-                <a:spcPts val="0"/>
-              </a:spcBef>
-              <a:spcAft>
-                <a:spcPts val="0"/>
-              </a:spcAft>
-              <a:buSzPts val="1300"/>
-              <a:buChar char="●"/>
-            </a:pPr>
-            <a:r>
-              <a:rPr lang="fr-FR" sz="1200" dirty="0" err="1"/>
-              <a:t>LiveData</a:t>
-            </a:r>
-            <a:r>
-              <a:rPr lang="fr-FR" sz="1200" dirty="0"/>
-              <a:t> </a:t>
-            </a:r>
-          </a:p>
-          <a:p>
-            <a:pPr lvl="1" indent="-311150">
-              <a:spcBef>
-                <a:spcPts val="0"/>
-              </a:spcBef>
-              <a:buSzPts val="1300"/>
-              <a:buChar char="●"/>
-            </a:pPr>
-            <a:r>
-              <a:rPr lang="fr-FR" sz="1000" dirty="0"/>
-              <a:t>Observable : sujet qui notifie l’observer (le fragment) quand les données </a:t>
-            </a:r>
-            <a:br>
-              <a:rPr lang="fr-FR" sz="1000" dirty="0"/>
-            </a:br>
-            <a:r>
-              <a:rPr lang="fr-FR" sz="1000" dirty="0"/>
-              <a:t>ont changé dans le </a:t>
-            </a:r>
-            <a:r>
-              <a:rPr lang="fr-FR" sz="1000" dirty="0" err="1"/>
-              <a:t>ViewModel</a:t>
-            </a:r>
-            <a:endParaRPr lang="fr-FR" sz="1000" dirty="0"/>
-          </a:p>
-          <a:p>
-            <a:pPr lvl="1" indent="-311150">
-              <a:spcBef>
-                <a:spcPts val="0"/>
-              </a:spcBef>
-              <a:buSzPts val="1300"/>
-              <a:buChar char="●"/>
-            </a:pPr>
-            <a:r>
-              <a:rPr lang="fr-FR" sz="1000" dirty="0"/>
               <a:t>connait l’état du </a:t>
             </a:r>
             <a:r>
@@ -11224,15 +11351,10 @@
             </a:r>
           </a:p>
           <a:p>
-            <a:pPr marL="914400" lvl="1" indent="-298450" algn="l" rtl="0">
-              <a:spcBef>
-                <a:spcPts val="0"/>
-              </a:spcBef>
-              <a:spcAft>
-                <a:spcPts val="0"/>
-              </a:spcAft>
-              <a:buSzPts val="1100"/>
-              <a:buChar char="○"/>
+            <a:pPr lvl="1">
+              <a:spcBef>
+                <a:spcPts val="0"/>
+              </a:spcBef>
             </a:pPr>
             <a:endParaRPr lang="fr-FR" sz="1200" dirty="0"/>
           </a:p>
@@ -11491,7 +11613,9 @@
             <a:ext cx="483652" cy="1228287"/>
           </a:xfrm>
           <a:prstGeom prst="bentConnector3">
-            <a:avLst/>
+            <a:avLst>
+              <a:gd name="adj1" fmla="val 50000"/>
+            </a:avLst>
           </a:prstGeom>
           <a:ln>
             <a:solidFill>
@@ -11537,7 +11661,9 @@
             <a:ext cx="484128" cy="1244431"/>
           </a:xfrm>
           <a:prstGeom prst="bentConnector3">
-            <a:avLst/>
+            <a:avLst>
+              <a:gd name="adj1" fmla="val 50000"/>
+            </a:avLst>
           </a:prstGeom>
           <a:ln>
             <a:solidFill>
@@ -11576,7 +11702,7 @@
         <p:spPr>
           <a:xfrm>
             <a:off x="6243344" y="2451022"/>
-            <a:ext cx="1779350" cy="769443"/>
+            <a:ext cx="1779350" cy="307777"/>
           </a:xfrm>
           <a:prstGeom prst="rect">
             <a:avLst/>
@@ -11626,7 +11752,7 @@
         <p:spPr>
           <a:xfrm>
             <a:off x="6243344" y="1472060"/>
-            <a:ext cx="1779350" cy="615554"/>
+            <a:ext cx="1779350" cy="307777"/>
           </a:xfrm>
           <a:prstGeom prst="rect">
             <a:avLst/>
@@ -11682,8 +11808,8 @@
         </p:nvCxnSpPr>
         <p:spPr>
           <a:xfrm>
-            <a:off x="7133019" y="2087614"/>
-            <a:ext cx="0" cy="363408"/>
+            <a:off x="7133019" y="1779837"/>
+            <a:ext cx="0" cy="671185"/>
           </a:xfrm>
           <a:prstGeom prst="straightConnector1">
             <a:avLst/>
@@ -11728,8 +11854,8 @@
         </p:nvCxnSpPr>
         <p:spPr>
           <a:xfrm>
-            <a:off x="7133019" y="3220465"/>
-            <a:ext cx="0" cy="338689"/>
+            <a:off x="7133019" y="2758799"/>
+            <a:ext cx="0" cy="800355"/>
           </a:xfrm>
           <a:prstGeom prst="straightConnector1">
             <a:avLst/>
@@ -11919,7 +12045,7 @@
           </a:xfrm>
           <a:prstGeom prst="bentConnector3">
             <a:avLst>
-              <a:gd name="adj1" fmla="val 1392200"/>
+              <a:gd name="adj1" fmla="val 458341"/>
             </a:avLst>
           </a:prstGeom>
           <a:ln>
@@ -12051,15 +12177,6 @@
           </a:bodyPr>
           <a:lstStyle/>
           <a:p>
-            <a:pPr marL="0" lvl="0" indent="0" algn="l" rtl="0">
-              <a:spcBef>
-                <a:spcPts val="0"/>
-              </a:spcBef>
-              <a:spcAft>
-                <a:spcPts val="0"/>
-              </a:spcAft>
-              <a:buNone/>
-            </a:pPr>
             <a:r>
               <a:rPr lang="fr"/>
               <a:t>Architecture générale</a:t>
@@ -12080,7 +12197,7 @@
         </p:nvSpPr>
         <p:spPr>
           <a:xfrm>
-            <a:off x="1297500" y="1107959"/>
+            <a:off x="1297500" y="1107960"/>
             <a:ext cx="7038900" cy="3370791"/>
           </a:xfrm>
           <a:prstGeom prst="rect">
@@ -12093,59 +12210,89 @@
           </a:bodyPr>
           <a:lstStyle/>
           <a:p>
-            <a:pPr marL="457200" lvl="0" indent="-311150" algn="l" rtl="0">
-              <a:spcBef>
-                <a:spcPts val="0"/>
-              </a:spcBef>
-              <a:spcAft>
-                <a:spcPts val="0"/>
-              </a:spcAft>
+            <a:r>
+              <a:rPr lang="en-GB" dirty="0" err="1"/>
+              <a:t>Basée</a:t>
+            </a:r>
+            <a:r>
+              <a:rPr lang="en-GB" dirty="0"/>
+              <a:t> sur les </a:t>
+            </a:r>
+            <a:r>
+              <a:rPr lang="en-GB" dirty="0" err="1"/>
+              <a:t>principes</a:t>
+            </a:r>
+            <a:r>
+              <a:rPr lang="en-GB" dirty="0"/>
+              <a:t> de Clean Architecture</a:t>
+            </a:r>
+          </a:p>
+          <a:p>
+            <a:r>
+              <a:rPr lang="en-GB" dirty="0"/>
+              <a:t>Organisation </a:t>
+            </a:r>
+            <a:r>
+              <a:rPr lang="en-GB" dirty="0" err="1"/>
+              <a:t>en</a:t>
+            </a:r>
+            <a:r>
+              <a:rPr lang="en-GB" dirty="0"/>
+              <a:t> modules :</a:t>
+            </a:r>
+          </a:p>
+          <a:p>
+            <a:pPr lvl="1" indent="-311154">
+              <a:spcBef>
+                <a:spcPts val="0"/>
+              </a:spcBef>
               <a:buSzPts val="1300"/>
               <a:buChar char="●"/>
             </a:pPr>
             <a:r>
-              <a:rPr lang="en-GB" dirty="0" err="1"/>
-              <a:t>Basée</a:t>
-            </a:r>
-            <a:r>
               <a:rPr lang="en-GB" dirty="0"/>
-              <a:t> sur les </a:t>
-            </a:r>
-            <a:r>
-              <a:rPr lang="en-GB" dirty="0" err="1"/>
-              <a:t>principes</a:t>
-            </a:r>
-            <a:r>
-              <a:rPr lang="en-GB" dirty="0"/>
-              <a:t> de Clean Architecture</a:t>
-            </a:r>
-          </a:p>
-          <a:p>
-            <a:pPr marL="457200" lvl="0" indent="-311150" algn="l" rtl="0">
-              <a:spcBef>
-                <a:spcPts val="0"/>
-              </a:spcBef>
-              <a:spcAft>
-                <a:spcPts val="0"/>
-              </a:spcAft>
+              <a:t>App</a:t>
+            </a:r>
+          </a:p>
+          <a:p>
+            <a:pPr lvl="2" indent="-311154">
+              <a:spcBef>
+                <a:spcPts val="0"/>
+              </a:spcBef>
               <a:buSzPts val="1300"/>
               <a:buChar char="●"/>
             </a:pPr>
             <a:r>
               <a:rPr lang="en-GB" dirty="0"/>
-              <a:t>Organisation </a:t>
+              <a:t>Fragments et </a:t>
             </a:r>
             <a:r>
               <a:rPr lang="en-GB" dirty="0" err="1"/>
-              <a:t>en</a:t>
+              <a:t>ViewModels</a:t>
             </a:r>
             <a:r>
               <a:rPr lang="en-GB" dirty="0"/>
-              <a:t> modules :</a:t>
-            </a:r>
-          </a:p>
-          <a:p>
-            <a:pPr lvl="1" indent="-311150">
+              <a:t> pour </a:t>
+            </a:r>
+            <a:r>
+              <a:rPr lang="en-GB" dirty="0" err="1"/>
+              <a:t>chaque</a:t>
+            </a:r>
+            <a:r>
+              <a:rPr lang="en-GB" dirty="0"/>
+              <a:t> page </a:t>
+            </a:r>
+            <a:r>
+              <a:rPr lang="en-GB" dirty="0" err="1"/>
+              <a:t>ou</a:t>
+            </a:r>
+            <a:r>
+              <a:rPr lang="en-GB" dirty="0"/>
+              <a:t> dialogue</a:t>
+            </a:r>
+          </a:p>
+          <a:p>
+            <a:pPr lvl="2" indent="-311154">
               <a:spcBef>
                 <a:spcPts val="0"/>
               </a:spcBef>
@@ -12154,11 +12301,24 @@
             </a:pPr>
             <a:r>
               <a:rPr lang="en-GB" dirty="0"/>
-              <a:t>App</a:t>
-            </a:r>
-          </a:p>
-          <a:p>
-            <a:pPr lvl="2" indent="-311150">
+              <a:t>Adapters et </a:t>
+            </a:r>
+            <a:r>
+              <a:rPr lang="en-GB" dirty="0" err="1"/>
+              <a:t>ViewHolders</a:t>
+            </a:r>
+            <a:r>
+              <a:rPr lang="en-GB" dirty="0"/>
+              <a:t> pour les </a:t>
+            </a:r>
+            <a:r>
+              <a:rPr lang="en-GB" dirty="0" err="1"/>
+              <a:t>RecyclerView</a:t>
+            </a:r>
+            <a:endParaRPr lang="en-GB" dirty="0"/>
+          </a:p>
+          <a:p>
+            <a:pPr lvl="2" indent="-311154">
               <a:spcBef>
                 <a:spcPts val="0"/>
               </a:spcBef>
@@ -12166,36 +12326,109 @@
               <a:buChar char="●"/>
             </a:pPr>
             <a:r>
+              <a:rPr lang="en-GB" dirty="0" err="1"/>
+              <a:t>Utilitaires</a:t>
+            </a:r>
+            <a:r>
               <a:rPr lang="en-GB" dirty="0"/>
-              <a:t>Fragments et </a:t>
+              <a:t> : </a:t>
+            </a:r>
+          </a:p>
+          <a:p>
+            <a:pPr lvl="3" indent="-311154">
+              <a:spcBef>
+                <a:spcPts val="0"/>
+              </a:spcBef>
+              <a:buSzPts val="1300"/>
+            </a:pPr>
+            <a:r>
+              <a:rPr lang="en-GB" dirty="0"/>
+              <a:t>gestion de </a:t>
             </a:r>
             <a:r>
               <a:rPr lang="en-GB" dirty="0" err="1"/>
-              <a:t>ViewModels</a:t>
+              <a:t>l’état</a:t>
             </a:r>
             <a:r>
               <a:rPr lang="en-GB" dirty="0"/>
-              <a:t> pour </a:t>
+              <a:t> du reseau (mode </a:t>
             </a:r>
             <a:r>
               <a:rPr lang="en-GB" dirty="0" err="1"/>
-              <a:t>chaque</a:t>
+              <a:t>en</a:t>
             </a:r>
             <a:r>
               <a:rPr lang="en-GB" dirty="0"/>
-              <a:t> page </a:t>
+              <a:t>/hors </a:t>
             </a:r>
             <a:r>
               <a:rPr lang="en-GB" dirty="0" err="1"/>
-              <a:t>ou</a:t>
+              <a:t>ligne</a:t>
             </a:r>
             <a:r>
               <a:rPr lang="en-GB" dirty="0"/>
-              <a:t> dialogue</a:t>
-            </a:r>
-          </a:p>
-          <a:p>
-            <a:pPr lvl="2" indent="-311150">
+              <a:t>)</a:t>
+            </a:r>
+          </a:p>
+          <a:p>
+            <a:pPr lvl="3" indent="-311154">
+              <a:spcBef>
+                <a:spcPts val="0"/>
+              </a:spcBef>
+              <a:buSzPts val="1300"/>
+            </a:pPr>
+            <a:r>
+              <a:rPr lang="en-GB" dirty="0"/>
+              <a:t>gestion de </a:t>
+            </a:r>
+            <a:r>
+              <a:rPr lang="en-GB" dirty="0" err="1"/>
+              <a:t>l’authentification</a:t>
+            </a:r>
+            <a:r>
+              <a:rPr lang="en-GB" dirty="0"/>
+              <a:t> et time-out pour la connexion à </a:t>
+            </a:r>
+            <a:r>
+              <a:rPr lang="en-GB" dirty="0" err="1"/>
+              <a:t>l’API</a:t>
+            </a:r>
+            <a:endParaRPr lang="en-GB" dirty="0"/>
+          </a:p>
+          <a:p>
+            <a:pPr lvl="3" indent="-311154">
+              <a:spcBef>
+                <a:spcPts val="0"/>
+              </a:spcBef>
+              <a:buSzPts val="1300"/>
+            </a:pPr>
+            <a:r>
+              <a:rPr lang="en-GB" dirty="0" err="1"/>
+              <a:t>téléchargement</a:t>
+            </a:r>
+            <a:r>
+              <a:rPr lang="en-GB" dirty="0"/>
+              <a:t> des images à </a:t>
+            </a:r>
+            <a:r>
+              <a:rPr lang="en-GB" dirty="0" err="1"/>
+              <a:t>partir</a:t>
+            </a:r>
+            <a:r>
+              <a:rPr lang="en-GB" dirty="0"/>
+              <a:t> de </a:t>
+            </a:r>
+            <a:r>
+              <a:rPr lang="en-GB" dirty="0" err="1"/>
+              <a:t>leur</a:t>
+            </a:r>
+            <a:r>
+              <a:rPr lang="en-GB" dirty="0"/>
+              <a:t> URL</a:t>
+            </a:r>
+          </a:p>
+          <a:p>
+            <a:pPr lvl="1" indent="-311154">
               <a:spcBef>
                 <a:spcPts val="0"/>
               </a:spcBef>
@@ -12204,24 +12437,11 @@
             </a:pPr>
             <a:r>
               <a:rPr lang="en-GB" dirty="0"/>
-              <a:t>Adapters et </a:t>
-            </a:r>
-            <a:r>
-              <a:rPr lang="en-GB" dirty="0" err="1"/>
-              <a:t>ViewHolders</a:t>
-            </a:r>
-            <a:r>
-              <a:rPr lang="en-GB" dirty="0"/>
-              <a:t> pour les </a:t>
-            </a:r>
-            <a:r>
-              <a:rPr lang="en-GB" dirty="0" err="1"/>
-              <a:t>RecyclerView</a:t>
-            </a:r>
-            <a:endParaRPr lang="en-GB" dirty="0"/>
-          </a:p>
-          <a:p>
-            <a:pPr lvl="2" indent="-311150">
+              <a:t>Common</a:t>
+            </a:r>
+          </a:p>
+          <a:p>
+            <a:pPr lvl="2" indent="-311154">
               <a:spcBef>
                 <a:spcPts val="0"/>
               </a:spcBef>
@@ -12230,43 +12450,31 @@
             </a:pPr>
             <a:r>
               <a:rPr lang="en-GB" dirty="0" err="1"/>
-              <a:t>Utilitaires</a:t>
+              <a:t>Fonctions</a:t>
             </a:r>
             <a:r>
               <a:rPr lang="en-GB" dirty="0"/>
-              <a:t> : </a:t>
-            </a:r>
-          </a:p>
-          <a:p>
-            <a:pPr lvl="3" indent="-311150">
-              <a:spcBef>
-                <a:spcPts val="0"/>
-              </a:spcBef>
-              <a:buSzPts val="1300"/>
-            </a:pPr>
+              <a:t> utilities (</a:t>
+            </a:r>
+            <a:r>
+              <a:rPr lang="en-GB" dirty="0" err="1"/>
+              <a:t>formattage</a:t>
+            </a:r>
             <a:r>
               <a:rPr lang="en-GB" dirty="0"/>
-              <a:t>gestion de </a:t>
+              <a:t> des </a:t>
             </a:r>
             <a:r>
               <a:rPr lang="en-GB" dirty="0" err="1"/>
-              <a:t>l’état</a:t>
+              <a:t>chaînes</a:t>
             </a:r>
             <a:r>
               <a:rPr lang="en-GB" dirty="0"/>
-              <a:t> du reseau (mode </a:t>
+              <a:t> de </a:t>
             </a:r>
             <a:r>
               <a:rPr lang="en-GB" dirty="0" err="1"/>
-              <a:t>en</a:t>
-            </a:r>
-            <a:r>
-              <a:rPr lang="en-GB" dirty="0"/>
-              <a:t>/hors </a:t>
-            </a:r>
-            <a:r>
-              <a:rPr lang="en-GB" dirty="0" err="1"/>
-              <a:t>ligne</a:t>
+              <a:t>caractères</a:t>
             </a:r>
             <a:r>
               <a:rPr lang="en-GB" dirty="0"/>
@@ -12274,64 +12482,7 @@
             </a:r>
           </a:p>
           <a:p>
-            <a:pPr lvl="3" indent="-311150">
-              <a:spcBef>
-                <a:spcPts val="0"/>
-              </a:spcBef>
-              <a:buSzPts val="1300"/>
-            </a:pPr>
-            <a:r>
-              <a:rPr lang="en-GB" dirty="0"/>
-              <a:t>gestion de </a:t>
-            </a:r>
-            <a:r>
-              <a:rPr lang="en-GB" dirty="0" err="1"/>
-              <a:t>l’authentification</a:t>
-            </a:r>
-            <a:r>
-              <a:rPr lang="en-GB" dirty="0"/>
-              <a:t> et time-out pour la connexion à </a:t>
-            </a:r>
-            <a:r>
-              <a:rPr lang="en-GB" dirty="0" err="1"/>
-              <a:t>l’API</a:t>
-            </a:r>
-            <a:endParaRPr lang="en-GB" dirty="0"/>
-          </a:p>
-          <a:p>
-            <a:pPr lvl="3" indent="-311150">
-              <a:spcBef>
-                <a:spcPts val="0"/>
-              </a:spcBef>
-              <a:buSzPts val="1300"/>
-            </a:pPr>
-            <a:r>
-              <a:rPr lang="en-GB" dirty="0" err="1"/>
-              <a:t>téléchargement</a:t>
-            </a:r>
-            <a:r>
-              <a:rPr lang="en-GB" dirty="0"/>
-              <a:t> des images à </a:t>
-            </a:r>
-            <a:r>
-              <a:rPr lang="en-GB" dirty="0" err="1"/>
-              <a:t>partir</a:t>
-            </a:r>
-            <a:r>
-              <a:rPr lang="en-GB" dirty="0"/>
-              <a:t> de </a:t>
-            </a:r>
-            <a:r>
-              <a:rPr lang="en-GB" dirty="0" err="1"/>
-              <a:t>leur</a:t>
-            </a:r>
-            <a:r>
-              <a:rPr lang="en-GB" dirty="0"/>
-              <a:t> URL</a:t>
-            </a:r>
-          </a:p>
-          <a:p>
-            <a:pPr lvl="1" indent="-311150">
+            <a:pPr lvl="1" indent="-311154">
               <a:spcBef>
                 <a:spcPts val="0"/>
               </a:spcBef>
@@ -12340,11 +12491,11 @@
             </a:pPr>
             <a:r>
               <a:rPr lang="en-GB" dirty="0"/>
-              <a:t>Common</a:t>
-            </a:r>
-          </a:p>
-          <a:p>
-            <a:pPr lvl="2" indent="-311150">
+              <a:t>Data</a:t>
+            </a:r>
+          </a:p>
+          <a:p>
+            <a:pPr lvl="2" indent="-311154">
               <a:spcBef>
                 <a:spcPts val="0"/>
               </a:spcBef>
@@ -12353,60 +12504,6 @@
             </a:pPr>
             <a:r>
               <a:rPr lang="en-GB" dirty="0" err="1"/>
-              <a:t>Fonctions</a:t>
-            </a:r>
-            <a:r>
-              <a:rPr lang="en-GB" dirty="0"/>
-              <a:t> utilities (</a:t>
-            </a:r>
-            <a:r>
-              <a:rPr lang="en-GB" dirty="0" err="1"/>
-              <a:t>formattage</a:t>
-            </a:r>
-            <a:r>
-              <a:rPr lang="en-GB" dirty="0"/>
-              <a:t> des </a:t>
-            </a:r>
-            <a:r>
-              <a:rPr lang="en-GB" dirty="0" err="1"/>
-              <a:t>chaînes</a:t>
-            </a:r>
-            <a:r>
-              <a:rPr lang="en-GB" dirty="0"/>
-              <a:t> de </a:t>
-            </a:r>
-            <a:r>
-              <a:rPr lang="en-GB" dirty="0" err="1"/>
-              <a:t>caractères</a:t>
-            </a:r>
-            <a:r>
-              <a:rPr lang="en-GB" dirty="0"/>
-              <a:t>)</a:t>
-            </a:r>
-          </a:p>
-          <a:p>
-            <a:pPr lvl="1" indent="-311150">
-              <a:spcBef>
-                <a:spcPts val="0"/>
-              </a:spcBef>
-              <a:buSzPts val="1300"/>
-              <a:buChar char="●"/>
-            </a:pPr>
-            <a:r>
-              <a:rPr lang="en-GB" dirty="0"/>
-              <a:t>Data</a:t>
-            </a:r>
-          </a:p>
-          <a:p>
-            <a:pPr lvl="2" indent="-311150">
-              <a:spcBef>
-                <a:spcPts val="0"/>
-              </a:spcBef>
-              <a:buSzPts val="1300"/>
-              <a:buChar char="●"/>
-            </a:pPr>
-            <a:r>
-              <a:rPr lang="en-GB" dirty="0" err="1"/>
               <a:t>Implémentation</a:t>
             </a:r>
             <a:r>
@@ -12447,7 +12544,7 @@
             </a:r>
           </a:p>
           <a:p>
-            <a:pPr lvl="2" indent="-311150">
+            <a:pPr lvl="2" indent="-311154">
               <a:spcBef>
                 <a:spcPts val="0"/>
               </a:spcBef>
@@ -12494,7 +12591,7 @@
             <a:endParaRPr lang="en-GB" dirty="0"/>
           </a:p>
           <a:p>
-            <a:pPr lvl="1" indent="-311150">
+            <a:pPr lvl="1" indent="-311154">
               <a:spcBef>
                 <a:spcPts val="0"/>
               </a:spcBef>
@@ -12507,7 +12604,7 @@
             </a:r>
           </a:p>
           <a:p>
-            <a:pPr lvl="2" indent="-311150">
+            <a:pPr lvl="2" indent="-311154">
               <a:spcBef>
                 <a:spcPts val="0"/>
               </a:spcBef>
@@ -12529,7 +12626,7 @@
             <a:endParaRPr lang="en-GB" dirty="0"/>
           </a:p>
           <a:p>
-            <a:pPr lvl="2" indent="-311150">
+            <a:pPr lvl="2" indent="-311154">
               <a:spcBef>
                 <a:spcPts val="0"/>
               </a:spcBef>
@@ -12586,7 +12683,7 @@
             </a:r>
           </a:p>
           <a:p>
-            <a:pPr lvl="3" indent="-311150">
+            <a:pPr lvl="3" indent="-311154">
               <a:spcBef>
                 <a:spcPts val="0"/>
               </a:spcBef>
@@ -12630,7 +12727,7 @@
             </a:r>
           </a:p>
           <a:p>
-            <a:pPr lvl="3" indent="-311150">
+            <a:pPr lvl="3" indent="-311154">
               <a:spcBef>
                 <a:spcPts val="0"/>
               </a:spcBef>
@@ -12722,15 +12819,6 @@
           </a:bodyPr>
           <a:lstStyle/>
           <a:p>
-            <a:pPr marL="0" lvl="0" indent="0" algn="l" rtl="0">
-              <a:spcBef>
-                <a:spcPts val="0"/>
-              </a:spcBef>
-              <a:spcAft>
-                <a:spcPts val="0"/>
-              </a:spcAft>
-              <a:buNone/>
-            </a:pPr>
             <a:r>
               <a:rPr lang="fr"/>
               <a:t>Navigation</a:t>
@@ -12764,16 +12852,6 @@
           </a:bodyPr>
           <a:lstStyle/>
           <a:p>
-            <a:pPr marL="457200" lvl="0" indent="-311150" algn="l" rtl="0">
-              <a:spcBef>
-                <a:spcPts val="0"/>
-              </a:spcBef>
-              <a:spcAft>
-                <a:spcPts val="0"/>
-              </a:spcAft>
-              <a:buSzPts val="1300"/>
-              <a:buChar char="●"/>
-            </a:pPr>
             <a:r>
               <a:rPr lang="fr" dirty="0"/>
               <a:t>Activité unique</a:t>
@@ -12781,16 +12859,6 @@
             <a:endParaRPr dirty="0"/>
           </a:p>
           <a:p>
-            <a:pPr marL="457200" lvl="0" indent="-311150" algn="l" rtl="0">
-              <a:spcBef>
-                <a:spcPts val="0"/>
-              </a:spcBef>
-              <a:spcAft>
-                <a:spcPts val="0"/>
-              </a:spcAft>
-              <a:buSzPts val="1300"/>
-              <a:buChar char="●"/>
-            </a:pPr>
             <a:r>
               <a:rPr lang="fr" dirty="0"/>
               <a:t>Plusieurs fragments</a:t>
@@ -12798,15 +12866,10 @@
             <a:endParaRPr dirty="0"/>
           </a:p>
           <a:p>
-            <a:pPr marL="914400" lvl="1" indent="-298450" algn="l" rtl="0">
-              <a:spcBef>
-                <a:spcPts val="0"/>
-              </a:spcBef>
-              <a:spcAft>
-                <a:spcPts val="0"/>
-              </a:spcAft>
-              <a:buSzPts val="1100"/>
-              <a:buChar char="○"/>
+            <a:pPr lvl="1">
+              <a:spcBef>
+                <a:spcPts val="0"/>
+              </a:spcBef>
             </a:pPr>
             <a:r>
               <a:rPr lang="fr" dirty="0"/>
@@ -12815,15 +12878,10 @@
             <a:endParaRPr dirty="0"/>
           </a:p>
           <a:p>
-            <a:pPr marL="914400" lvl="1" indent="-298450" algn="l" rtl="0">
-              <a:spcBef>
-                <a:spcPts val="0"/>
-              </a:spcBef>
-              <a:spcAft>
-                <a:spcPts val="0"/>
-              </a:spcAft>
-              <a:buSzPts val="1100"/>
-              <a:buChar char="○"/>
+            <a:pPr lvl="1">
+              <a:spcBef>
+                <a:spcPts val="0"/>
+              </a:spcBef>
             </a:pPr>
             <a:r>
               <a:rPr lang="fr" dirty="0"/>
@@ -12832,15 +12890,10 @@
             <a:endParaRPr dirty="0"/>
           </a:p>
           <a:p>
-            <a:pPr marL="914400" lvl="1" indent="-298450" algn="l" rtl="0">
-              <a:spcBef>
-                <a:spcPts val="0"/>
-              </a:spcBef>
-              <a:spcAft>
-                <a:spcPts val="0"/>
-              </a:spcAft>
-              <a:buSzPts val="1100"/>
-              <a:buChar char="○"/>
+            <a:pPr lvl="1">
+              <a:spcBef>
+                <a:spcPts val="0"/>
+              </a:spcBef>
             </a:pPr>
             <a:r>
               <a:rPr lang="fr" dirty="0"/>
@@ -12849,15 +12902,10 @@
             <a:endParaRPr dirty="0"/>
           </a:p>
           <a:p>
-            <a:pPr marL="914400" lvl="1" indent="-298450" algn="l" rtl="0">
-              <a:spcBef>
-                <a:spcPts val="0"/>
-              </a:spcBef>
-              <a:spcAft>
-                <a:spcPts val="0"/>
-              </a:spcAft>
-              <a:buSzPts val="1100"/>
-              <a:buChar char="○"/>
+            <a:pPr lvl="1">
+              <a:spcBef>
+                <a:spcPts val="0"/>
+              </a:spcBef>
             </a:pPr>
             <a:r>
               <a:rPr lang="fr" dirty="0"/>
@@ -12866,16 +12914,6 @@
             <a:endParaRPr dirty="0"/>
           </a:p>
           <a:p>
-            <a:pPr marL="457200" lvl="0" indent="-311150" algn="l" rtl="0">
-              <a:spcBef>
-                <a:spcPts val="0"/>
-              </a:spcBef>
-              <a:spcAft>
-                <a:spcPts val="0"/>
-              </a:spcAft>
-              <a:buSzPts val="1300"/>
-              <a:buChar char="●"/>
-            </a:pPr>
             <a:r>
               <a:rPr lang="fr" dirty="0"/>
               <a:t>Le “NavHostFragment” (JetPack Navigation) agit comme un routeur et gère le “back stack” des fragments</a:t>
@@ -12883,15 +12921,10 @@
             <a:endParaRPr dirty="0"/>
           </a:p>
           <a:p>
-            <a:pPr marL="914400" lvl="1" indent="-298450" algn="l" rtl="0">
-              <a:spcBef>
-                <a:spcPts val="0"/>
-              </a:spcBef>
-              <a:spcAft>
-                <a:spcPts val="0"/>
-              </a:spcAft>
-              <a:buSzPts val="1100"/>
-              <a:buChar char="○"/>
+            <a:pPr lvl="1">
+              <a:spcBef>
+                <a:spcPts val="0"/>
+              </a:spcBef>
             </a:pPr>
             <a:r>
               <a:rPr lang="fr" dirty="0"/>
@@ -12900,15 +12933,10 @@
             <a:endParaRPr dirty="0"/>
           </a:p>
           <a:p>
-            <a:pPr marL="914400" lvl="1" indent="-298450" algn="l" rtl="0">
-              <a:spcBef>
-                <a:spcPts val="0"/>
-              </a:spcBef>
-              <a:spcAft>
-                <a:spcPts val="0"/>
-              </a:spcAft>
-              <a:buSzPts val="1100"/>
-              <a:buChar char="○"/>
+            <a:pPr lvl="1">
+              <a:spcBef>
+                <a:spcPts val="0"/>
+              </a:spcBef>
             </a:pPr>
             <a:r>
               <a:rPr lang="fr" dirty="0"/>
@@ -12917,15 +12945,10 @@
             <a:endParaRPr dirty="0"/>
           </a:p>
           <a:p>
-            <a:pPr marL="914400" lvl="1" indent="-298450" algn="l" rtl="0">
-              <a:spcBef>
-                <a:spcPts val="0"/>
-              </a:spcBef>
-              <a:spcAft>
-                <a:spcPts val="0"/>
-              </a:spcAft>
-              <a:buSzPts val="1100"/>
-              <a:buChar char="○"/>
+            <a:pPr lvl="1">
+              <a:spcBef>
+                <a:spcPts val="0"/>
+              </a:spcBef>
             </a:pPr>
             <a:r>
               <a:rPr lang="fr" dirty="0"/>
@@ -12934,16 +12957,6 @@
             <a:endParaRPr dirty="0"/>
           </a:p>
           <a:p>
-            <a:pPr marL="457200" lvl="0" indent="-311150" algn="l" rtl="0">
-              <a:spcBef>
-                <a:spcPts val="0"/>
-              </a:spcBef>
-              <a:spcAft>
-                <a:spcPts val="0"/>
-              </a:spcAft>
-              <a:buSzPts val="1300"/>
-              <a:buChar char="●"/>
-            </a:pPr>
             <a:r>
               <a:rPr lang="fr" dirty="0"/>
               <a:t>Transfert de données entre les différents fragments via : safe-arg</a:t>
@@ -13002,15 +13015,6 @@
           </a:bodyPr>
           <a:lstStyle/>
           <a:p>
-            <a:pPr marL="0" lvl="0" indent="0" algn="l" rtl="0">
-              <a:spcBef>
-                <a:spcPts val="0"/>
-              </a:spcBef>
-              <a:spcAft>
-                <a:spcPts val="0"/>
-              </a:spcAft>
-              <a:buNone/>
-            </a:pPr>
             <a:r>
               <a:rPr lang="fr"/>
               <a:t>Scanner</a:t>
@@ -13044,16 +13048,6 @@
           </a:bodyPr>
           <a:lstStyle/>
           <a:p>
-            <a:pPr marL="457200" lvl="0" indent="-311150" algn="l" rtl="0">
-              <a:spcBef>
-                <a:spcPts val="0"/>
-              </a:spcBef>
-              <a:spcAft>
-                <a:spcPts val="0"/>
-              </a:spcAft>
-              <a:buSzPts val="1300"/>
-              <a:buChar char="●"/>
-            </a:pPr>
             <a:r>
               <a:rPr lang="en-GB" dirty="0"/>
               <a:t>G</a:t>
@@ -13072,58 +13066,18 @@
             </a:r>
           </a:p>
           <a:p>
-            <a:pPr marL="457200" lvl="0" indent="-311150" algn="l" rtl="0">
-              <a:spcBef>
-                <a:spcPts val="0"/>
-              </a:spcBef>
-              <a:spcAft>
-                <a:spcPts val="0"/>
-              </a:spcAft>
-              <a:buSzPts val="1300"/>
-              <a:buChar char="●"/>
-            </a:pPr>
             <a:endParaRPr lang="fr" dirty="0"/>
           </a:p>
           <a:p>
-            <a:pPr marL="457200" lvl="0" indent="-311150" algn="l" rtl="0">
-              <a:spcBef>
-                <a:spcPts val="0"/>
-              </a:spcBef>
-              <a:spcAft>
-                <a:spcPts val="0"/>
-              </a:spcAft>
-              <a:buSzPts val="1300"/>
-              <a:buChar char="●"/>
-            </a:pPr>
             <a:r>
               <a:rPr lang="fr" dirty="0"/>
               <a:t> Acquisition des images toutes les ½ secondes</a:t>
             </a:r>
           </a:p>
           <a:p>
-            <a:pPr marL="457200" lvl="0" indent="-311150" algn="l" rtl="0">
-              <a:spcBef>
-                <a:spcPts val="0"/>
-              </a:spcBef>
-              <a:spcAft>
-                <a:spcPts val="0"/>
-              </a:spcAft>
-              <a:buSzPts val="1300"/>
-              <a:buChar char="●"/>
-            </a:pPr>
             <a:endParaRPr lang="fr" dirty="0"/>
           </a:p>
           <a:p>
-            <a:pPr marL="457200" lvl="0" indent="-311150" algn="l" rtl="0">
-              <a:spcBef>
-                <a:spcPts val="0"/>
-              </a:spcBef>
-              <a:spcAft>
-                <a:spcPts val="0"/>
-              </a:spcAft>
-              <a:buSzPts val="1300"/>
-              <a:buChar char="●"/>
-            </a:pPr>
             <a:r>
               <a:rPr lang="en-GB" dirty="0"/>
               <a:t>Analyse</a:t>
@@ -13134,29 +13088,9 @@
             </a:r>
           </a:p>
           <a:p>
-            <a:pPr marL="457200" lvl="0" indent="-311150" algn="l" rtl="0">
-              <a:spcBef>
-                <a:spcPts val="0"/>
-              </a:spcBef>
-              <a:spcAft>
-                <a:spcPts val="0"/>
-              </a:spcAft>
-              <a:buSzPts val="1300"/>
-              <a:buChar char="●"/>
-            </a:pPr>
             <a:endParaRPr lang="fr" dirty="0"/>
           </a:p>
           <a:p>
-            <a:pPr marL="457200" lvl="0" indent="-311150" algn="l" rtl="0">
-              <a:spcBef>
-                <a:spcPts val="0"/>
-              </a:spcBef>
-              <a:spcAft>
-                <a:spcPts val="0"/>
-              </a:spcAft>
-              <a:buSzPts val="1300"/>
-              <a:buChar char="●"/>
-            </a:pPr>
             <a:r>
               <a:rPr lang="en-GB" dirty="0" err="1"/>
               <a:t>Dès</a:t>
@@ -13278,6 +13212,124 @@
 </file>
 
 <file path=ppt/slides/slide8.xml><?xml version="1.0" encoding="utf-8"?>
+<p:sld xmlns:a="http://schemas.openxmlformats.org/drawingml/2006/main" xmlns:r="http://schemas.openxmlformats.org/officeDocument/2006/relationships" xmlns:p="http://schemas.openxmlformats.org/presentationml/2006/main">
+  <p:cSld>
+    <p:spTree>
+      <p:nvGrpSpPr>
+        <p:cNvPr id="1" name=""/>
+        <p:cNvGrpSpPr/>
+        <p:nvPr/>
+      </p:nvGrpSpPr>
+      <p:grpSpPr>
+        <a:xfrm>
+          <a:off x="0" y="0"/>
+          <a:ext cx="0" cy="0"/>
+          <a:chOff x="0" y="0"/>
+          <a:chExt cx="0" cy="0"/>
+        </a:xfrm>
+      </p:grpSpPr>
+      <p:sp>
+        <p:nvSpPr>
+          <p:cNvPr id="2" name="Title 1">
+            <a:extLst>
+              <a:ext uri="{FF2B5EF4-FFF2-40B4-BE49-F238E27FC236}">
+                <a16:creationId xmlns:a16="http://schemas.microsoft.com/office/drawing/2014/main" id="{FEFD6CC5-B758-EF49-A511-3FB9CAB75062}"/>
+              </a:ext>
+            </a:extLst>
+          </p:cNvPr>
+          <p:cNvSpPr>
+            <a:spLocks noGrp="1"/>
+          </p:cNvSpPr>
+          <p:nvPr>
+            <p:ph type="title"/>
+          </p:nvPr>
+        </p:nvSpPr>
+        <p:spPr/>
+        <p:txBody>
+          <a:bodyPr/>
+          <a:lstStyle/>
+          <a:p>
+            <a:r>
+              <a:rPr lang="en-CH" dirty="0"/>
+              <a:t>Scanner flow diagram</a:t>
+            </a:r>
+          </a:p>
+        </p:txBody>
+      </p:sp>
+      <p:pic>
+        <p:nvPicPr>
+          <p:cNvPr id="5" name="Picture 4" descr="Diagram&#10;&#10;Description automatically generated">
+            <a:extLst>
+              <a:ext uri="{FF2B5EF4-FFF2-40B4-BE49-F238E27FC236}">
+                <a16:creationId xmlns:a16="http://schemas.microsoft.com/office/drawing/2014/main" id="{4D37B93B-F05C-C74B-99A9-5E351ADC6448}"/>
+              </a:ext>
+            </a:extLst>
+          </p:cNvPr>
+          <p:cNvPicPr>
+            <a:picLocks noChangeAspect="1"/>
+          </p:cNvPicPr>
+          <p:nvPr/>
+        </p:nvPicPr>
+        <p:blipFill>
+          <a:blip r:embed="rId2"/>
+          <a:stretch>
+            <a:fillRect/>
+          </a:stretch>
+        </p:blipFill>
+        <p:spPr>
+          <a:xfrm>
+            <a:off x="3566794" y="1156844"/>
+            <a:ext cx="2500313" cy="3671346"/>
+          </a:xfrm>
+          <a:prstGeom prst="rect">
+            <a:avLst/>
+          </a:prstGeom>
+          <a:solidFill>
+            <a:srgbClr val="FFFFFF">
+              <a:shade val="85000"/>
+            </a:srgbClr>
+          </a:solidFill>
+          <a:ln w="88900" cap="sq">
+            <a:solidFill>
+              <a:srgbClr val="FFFFFF"/>
+            </a:solidFill>
+            <a:miter lim="800000"/>
+          </a:ln>
+          <a:effectLst>
+            <a:outerShdw blurRad="55000" dist="18000" dir="5400000" algn="tl" rotWithShape="0">
+              <a:srgbClr val="000000">
+                <a:alpha val="40000"/>
+              </a:srgbClr>
+            </a:outerShdw>
+          </a:effectLst>
+          <a:scene3d>
+            <a:camera prst="orthographicFront"/>
+            <a:lightRig rig="twoPt" dir="t">
+              <a:rot lat="0" lon="0" rev="7200000"/>
+            </a:lightRig>
+          </a:scene3d>
+          <a:sp3d>
+            <a:bevelT w="25400" h="19050"/>
+            <a:contourClr>
+              <a:srgbClr val="FFFFFF"/>
+            </a:contourClr>
+          </a:sp3d>
+        </p:spPr>
+      </p:pic>
+    </p:spTree>
+    <p:extLst>
+      <p:ext uri="{BB962C8B-B14F-4D97-AF65-F5344CB8AC3E}">
+        <p14:creationId xmlns:p14="http://schemas.microsoft.com/office/powerpoint/2010/main" val="4293846360"/>
+      </p:ext>
+    </p:extLst>
+  </p:cSld>
+  <p:clrMapOvr>
+    <a:masterClrMapping/>
+  </p:clrMapOvr>
+</p:sld>
+</file>
+
+<file path=ppt/slides/slide9.xml><?xml version="1.0" encoding="utf-8"?>
 <p:sld xmlns:a="http://schemas.openxmlformats.org/drawingml/2006/main" xmlns:r="http://schemas.openxmlformats.org/officeDocument/2006/relationships" xmlns:p="http://schemas.openxmlformats.org/presentationml/2006/main">
   <p:cSld>
     <p:spTree>
@@ -13319,15 +13371,6 @@
           </a:bodyPr>
           <a:lstStyle/>
           <a:p>
-            <a:pPr marL="0" lvl="0" indent="0" algn="l" rtl="0">
-              <a:spcBef>
-                <a:spcPts val="0"/>
-              </a:spcBef>
-              <a:spcAft>
-                <a:spcPts val="0"/>
-              </a:spcAft>
-              <a:buNone/>
-            </a:pPr>
             <a:r>
               <a:rPr lang="fr"/>
               <a:t>Détails produit</a:t>
@@ -13348,7 +13391,7 @@
         </p:nvSpPr>
         <p:spPr>
           <a:xfrm>
-            <a:off x="1297500" y="1581844"/>
+            <a:off x="1297500" y="1581845"/>
             <a:ext cx="7038900" cy="2896905"/>
           </a:xfrm>
           <a:prstGeom prst="rect">
@@ -13361,23 +13404,13 @@
           </a:bodyPr>
           <a:lstStyle/>
           <a:p>
-            <a:pPr marL="457200" lvl="0" indent="-311150" algn="l" rtl="0">
-              <a:spcBef>
-                <a:spcPts val="0"/>
-              </a:spcBef>
-              <a:spcAft>
-                <a:spcPts val="0"/>
-              </a:spcAft>
-              <a:buSzPts val="1300"/>
-              <a:buChar char="●"/>
-            </a:pPr>
             <a:r>
               <a:rPr lang="fr" dirty="0"/>
               <a:t>Stratégie : </a:t>
             </a:r>
           </a:p>
           <a:p>
-            <a:pPr lvl="1" indent="-311150">
+            <a:pPr lvl="1" indent="-311154">
               <a:spcBef>
                 <a:spcPts val="0"/>
               </a:spcBef>
@@ -13391,7 +13424,7 @@
             </a:r>
           </a:p>
           <a:p>
-            <a:pPr lvl="1" indent="-311150">
+            <a:pPr lvl="1" indent="-311154">
               <a:spcBef>
                 <a:spcPts val="0"/>
               </a:spcBef>
@@ -13405,7 +13438,7 @@
             </a:r>
           </a:p>
           <a:p>
-            <a:pPr marL="603250" lvl="1" indent="0">
+            <a:pPr marL="603258" lvl="1" indent="0">
               <a:spcBef>
                 <a:spcPts val="0"/>
               </a:spcBef>
@@ -13415,16 +13448,6 @@
             <a:endParaRPr lang="fr" dirty="0"/>
           </a:p>
           <a:p>
-            <a:pPr marL="457200" lvl="0" indent="-311150" algn="l" rtl="0">
-              <a:spcBef>
-                <a:spcPts val="0"/>
-              </a:spcBef>
-              <a:spcAft>
-                <a:spcPts val="0"/>
-              </a:spcAft>
-              <a:buSzPts val="1300"/>
-              <a:buChar char="●"/>
-            </a:pPr>
             <a:r>
               <a:rPr lang="fr" dirty="0"/>
               <a:t>Programmation asynchrone</a:t>
@@ -13432,32 +13455,12 @@
             <a:endParaRPr dirty="0"/>
           </a:p>
           <a:p>
-            <a:pPr marL="457200" lvl="0" indent="-311150" algn="l" rtl="0">
-              <a:spcBef>
-                <a:spcPts val="0"/>
-              </a:spcBef>
-              <a:spcAft>
-                <a:spcPts val="0"/>
-              </a:spcAft>
-              <a:buSzPts val="1300"/>
-              <a:buChar char="●"/>
-            </a:pPr>
             <a:r>
               <a:rPr lang="fr" dirty="0"/>
               <a:t>Retrofit </a:t>
             </a:r>
           </a:p>
           <a:p>
-            <a:pPr marL="457200" lvl="0" indent="-311150" algn="l" rtl="0">
-              <a:spcBef>
-                <a:spcPts val="0"/>
-              </a:spcBef>
-              <a:spcAft>
-                <a:spcPts val="0"/>
-              </a:spcAft>
-              <a:buSzPts val="1300"/>
-              <a:buChar char="●"/>
-            </a:pPr>
             <a:r>
               <a:rPr lang="fr" dirty="0"/>
               <a:t>Moshi (JSON parsing)</a:t>
@@ -13465,16 +13468,6 @@
             <a:endParaRPr dirty="0"/>
           </a:p>
           <a:p>
-            <a:pPr marL="457200" lvl="0" indent="-311150" algn="l" rtl="0">
-              <a:spcBef>
-                <a:spcPts val="0"/>
-              </a:spcBef>
-              <a:spcAft>
-                <a:spcPts val="0"/>
-              </a:spcAft>
-              <a:buSzPts val="1300"/>
-              <a:buChar char="●"/>
-            </a:pPr>
             <a:r>
               <a:rPr lang="fr" dirty="0"/>
               <a:t>Coroutines</a:t>
@@ -13482,15 +13475,10 @@
             <a:endParaRPr dirty="0"/>
           </a:p>
           <a:p>
-            <a:pPr marL="914400" lvl="1" indent="-298450" algn="l" rtl="0">
-              <a:spcBef>
-                <a:spcPts val="0"/>
-              </a:spcBef>
-              <a:spcAft>
-                <a:spcPts val="0"/>
-              </a:spcAft>
-              <a:buSzPts val="1100"/>
-              <a:buChar char="○"/>
+            <a:pPr lvl="1">
+              <a:spcBef>
+                <a:spcPts val="0"/>
+              </a:spcBef>
             </a:pPr>
             <a:r>
               <a:rPr lang="en-GB" dirty="0"/>
@@ -13503,456 +13491,16 @@
             <a:endParaRPr dirty="0"/>
           </a:p>
           <a:p>
-            <a:pPr marL="914400" lvl="1" indent="-298450" algn="l" rtl="0">
-              <a:spcBef>
-                <a:spcPts val="0"/>
-              </a:spcBef>
-              <a:spcAft>
-                <a:spcPts val="0"/>
-              </a:spcAft>
-              <a:buSzPts val="1100"/>
-              <a:buChar char="○"/>
+            <a:pPr lvl="1">
+              <a:spcBef>
+                <a:spcPts val="0"/>
+              </a:spcBef>
             </a:pPr>
             <a:r>
               <a:rPr lang="fr" dirty="0"/>
               <a:t>Processus asynchrone, qui s’exécute sur un thread autre que UI de manière à ne pas bloquer le thread UI</a:t>
             </a:r>
             <a:endParaRPr dirty="0"/>
-          </a:p>
-        </p:txBody>
-      </p:sp>
-    </p:spTree>
-  </p:cSld>
-  <p:clrMapOvr>
-    <a:masterClrMapping/>
-  </p:clrMapOvr>
-</p:sld>
-</file>
-
-<file path=ppt/slides/slide9.xml><?xml version="1.0" encoding="utf-8"?>
-<p:sld xmlns:a="http://schemas.openxmlformats.org/drawingml/2006/main" xmlns:r="http://schemas.openxmlformats.org/officeDocument/2006/relationships" xmlns:p="http://schemas.openxmlformats.org/presentationml/2006/main">
-  <p:cSld>
-    <p:spTree>
-      <p:nvGrpSpPr>
-        <p:cNvPr id="1" name="Shape 176"/>
-        <p:cNvGrpSpPr/>
-        <p:nvPr/>
-      </p:nvGrpSpPr>
-      <p:grpSpPr>
-        <a:xfrm>
-          <a:off x="0" y="0"/>
-          <a:ext cx="0" cy="0"/>
-          <a:chOff x="0" y="0"/>
-          <a:chExt cx="0" cy="0"/>
-        </a:xfrm>
-      </p:grpSpPr>
-      <p:sp>
-        <p:nvSpPr>
-          <p:cNvPr id="177" name="Google Shape;177;p20"/>
-          <p:cNvSpPr txBox="1">
-            <a:spLocks noGrp="1"/>
-          </p:cNvSpPr>
-          <p:nvPr>
-            <p:ph type="title"/>
-          </p:nvPr>
-        </p:nvSpPr>
-        <p:spPr>
-          <a:xfrm>
-            <a:off x="1297500" y="393750"/>
-            <a:ext cx="7038900" cy="914100"/>
-          </a:xfrm>
-          <a:prstGeom prst="rect">
-            <a:avLst/>
-          </a:prstGeom>
-        </p:spPr>
-        <p:txBody>
-          <a:bodyPr spcFirstLastPara="1" wrap="square" lIns="91425" tIns="91425" rIns="91425" bIns="91425" anchor="t" anchorCtr="0">
-            <a:noAutofit/>
-          </a:bodyPr>
-          <a:lstStyle/>
-          <a:p>
-            <a:pPr marL="0" lvl="0" indent="0" algn="l" rtl="0">
-              <a:spcBef>
-                <a:spcPts val="0"/>
-              </a:spcBef>
-              <a:spcAft>
-                <a:spcPts val="0"/>
-              </a:spcAft>
-              <a:buNone/>
-            </a:pPr>
-            <a:r>
-              <a:rPr lang="fr"/>
-              <a:t>Historique</a:t>
-            </a:r>
-            <a:endParaRPr/>
-          </a:p>
-        </p:txBody>
-      </p:sp>
-      <p:sp>
-        <p:nvSpPr>
-          <p:cNvPr id="178" name="Google Shape;178;p20"/>
-          <p:cNvSpPr txBox="1">
-            <a:spLocks noGrp="1"/>
-          </p:cNvSpPr>
-          <p:nvPr>
-            <p:ph type="body" idx="1"/>
-          </p:nvPr>
-        </p:nvSpPr>
-        <p:spPr>
-          <a:xfrm>
-            <a:off x="1297500" y="1567550"/>
-            <a:ext cx="7038900" cy="2911200"/>
-          </a:xfrm>
-          <a:prstGeom prst="rect">
-            <a:avLst/>
-          </a:prstGeom>
-        </p:spPr>
-        <p:txBody>
-          <a:bodyPr spcFirstLastPara="1" wrap="square" lIns="91425" tIns="91425" rIns="91425" bIns="91425" anchor="t" anchorCtr="0">
-            <a:noAutofit/>
-          </a:bodyPr>
-          <a:lstStyle/>
-          <a:p>
-            <a:pPr marL="457200" lvl="0" indent="-311150" algn="l" rtl="0">
-              <a:spcBef>
-                <a:spcPts val="0"/>
-              </a:spcBef>
-              <a:spcAft>
-                <a:spcPts val="0"/>
-              </a:spcAft>
-              <a:buSzPts val="1300"/>
-              <a:buChar char="●"/>
-            </a:pPr>
-            <a:r>
-              <a:rPr lang="fr" dirty="0"/>
-              <a:t>La liste des produits recherchés par le passé apparaît sous la forme d’une liste.</a:t>
-            </a:r>
-          </a:p>
-          <a:p>
-            <a:pPr marL="457200" lvl="0" indent="-311150" algn="l" rtl="0">
-              <a:spcBef>
-                <a:spcPts val="0"/>
-              </a:spcBef>
-              <a:spcAft>
-                <a:spcPts val="0"/>
-              </a:spcAft>
-              <a:buSzPts val="1300"/>
-              <a:buChar char="●"/>
-            </a:pPr>
-            <a:endParaRPr lang="fr" dirty="0"/>
-          </a:p>
-          <a:p>
-            <a:pPr marL="457200" lvl="0" indent="-311150" algn="l" rtl="0">
-              <a:spcBef>
-                <a:spcPts val="0"/>
-              </a:spcBef>
-              <a:spcAft>
-                <a:spcPts val="0"/>
-              </a:spcAft>
-              <a:buSzPts val="1300"/>
-              <a:buChar char="●"/>
-            </a:pPr>
-            <a:r>
-              <a:rPr lang="fr" dirty="0"/>
-              <a:t>RecyclerView</a:t>
-            </a:r>
-            <a:endParaRPr dirty="0"/>
-          </a:p>
-          <a:p>
-            <a:pPr marL="914400" lvl="1" indent="-298450" algn="l" rtl="0">
-              <a:spcBef>
-                <a:spcPts val="0"/>
-              </a:spcBef>
-              <a:spcAft>
-                <a:spcPts val="0"/>
-              </a:spcAft>
-              <a:buSzPts val="1100"/>
-              <a:buChar char="○"/>
-            </a:pPr>
-            <a:r>
-              <a:rPr lang="fr-FR" dirty="0"/>
-              <a:t>Adapter : Permet de faire la liaison entre la vue </a:t>
-            </a:r>
-            <a:r>
-              <a:rPr lang="fr-FR" dirty="0" err="1"/>
-              <a:t>RecyclerView</a:t>
-            </a:r>
-            <a:r>
-              <a:rPr lang="fr-FR" dirty="0"/>
-              <a:t> et la liste de données, </a:t>
-            </a:r>
-            <a:r>
-              <a:rPr lang="en-GB" dirty="0" err="1"/>
-              <a:t>crée</a:t>
-            </a:r>
-            <a:r>
-              <a:rPr lang="en-GB" dirty="0"/>
-              <a:t> et </a:t>
-            </a:r>
-            <a:r>
-              <a:rPr lang="en-GB" dirty="0" err="1"/>
-              <a:t>réutilise</a:t>
-            </a:r>
-            <a:r>
-              <a:rPr lang="en-GB" dirty="0"/>
-              <a:t> le(s) </a:t>
-            </a:r>
-            <a:r>
-              <a:rPr lang="en-GB" dirty="0" err="1"/>
-              <a:t>ViewHolder</a:t>
-            </a:r>
-            <a:r>
-              <a:rPr lang="en-GB" dirty="0"/>
-              <a:t>(s) qui </a:t>
-            </a:r>
-            <a:r>
-              <a:rPr lang="en-GB" dirty="0" err="1"/>
-              <a:t>vont</a:t>
-            </a:r>
-            <a:r>
-              <a:rPr lang="en-GB" dirty="0"/>
-              <a:t> </a:t>
-            </a:r>
-            <a:r>
-              <a:rPr lang="en-GB" dirty="0" err="1"/>
-              <a:t>être</a:t>
-            </a:r>
-            <a:r>
-              <a:rPr lang="en-GB" dirty="0"/>
-              <a:t> </a:t>
-            </a:r>
-            <a:r>
-              <a:rPr lang="en-GB" dirty="0" err="1"/>
-              <a:t>nécessaires</a:t>
-            </a:r>
-            <a:r>
-              <a:rPr lang="en-GB" dirty="0"/>
-              <a:t> pour </a:t>
-            </a:r>
-            <a:r>
-              <a:rPr lang="en-GB" dirty="0" err="1"/>
-              <a:t>afficher</a:t>
-            </a:r>
-            <a:r>
-              <a:rPr lang="en-GB" dirty="0"/>
-              <a:t> les </a:t>
-            </a:r>
-            <a:r>
-              <a:rPr lang="en-GB" dirty="0" err="1"/>
-              <a:t>données</a:t>
-            </a:r>
-            <a:r>
-              <a:rPr lang="en-GB" dirty="0"/>
-              <a:t> </a:t>
-            </a:r>
-            <a:r>
-              <a:rPr lang="en-GB" dirty="0" err="1"/>
-              <a:t>en</a:t>
-            </a:r>
-            <a:r>
-              <a:rPr lang="en-GB" dirty="0"/>
-              <a:t> function de </a:t>
-            </a:r>
-            <a:r>
-              <a:rPr lang="en-GB" dirty="0" err="1"/>
-              <a:t>leur</a:t>
-            </a:r>
-            <a:r>
-              <a:rPr lang="en-GB" dirty="0"/>
-              <a:t> position dans la </a:t>
-            </a:r>
-            <a:r>
-              <a:rPr lang="en-GB" dirty="0" err="1"/>
-              <a:t>liste</a:t>
-            </a:r>
-            <a:r>
-              <a:rPr lang="en-GB" dirty="0"/>
-              <a:t>.</a:t>
-            </a:r>
-          </a:p>
-          <a:p>
-            <a:pPr marL="914400" lvl="1" indent="-298450" algn="l" rtl="0">
-              <a:spcBef>
-                <a:spcPts val="0"/>
-              </a:spcBef>
-              <a:spcAft>
-                <a:spcPts val="0"/>
-              </a:spcAft>
-              <a:buSzPts val="1100"/>
-              <a:buChar char="○"/>
-            </a:pPr>
-            <a:endParaRPr lang="fr-FR" dirty="0"/>
-          </a:p>
-          <a:p>
-            <a:pPr marL="914400" lvl="1" indent="-298450" algn="l" rtl="0">
-              <a:spcBef>
-                <a:spcPts val="0"/>
-              </a:spcBef>
-              <a:spcAft>
-                <a:spcPts val="0"/>
-              </a:spcAft>
-              <a:buSzPts val="1100"/>
-              <a:buChar char="○"/>
-            </a:pPr>
-            <a:r>
-              <a:rPr lang="fr-FR" dirty="0" err="1"/>
-              <a:t>ViewHolder</a:t>
-            </a:r>
-            <a:r>
-              <a:rPr lang="fr-FR" dirty="0"/>
-              <a:t> : Permet de représenter visuellement un élément de la liste de données dans le </a:t>
-            </a:r>
-            <a:r>
-              <a:rPr lang="fr-FR" dirty="0" err="1"/>
-              <a:t>RecyclerView</a:t>
-            </a:r>
-            <a:r>
-              <a:rPr lang="fr-FR" dirty="0"/>
-              <a:t> (une ligne).</a:t>
-            </a:r>
-          </a:p>
-          <a:p>
-            <a:pPr marL="914400" lvl="1" indent="-298450" algn="l" rtl="0">
-              <a:spcBef>
-                <a:spcPts val="0"/>
-              </a:spcBef>
-              <a:spcAft>
-                <a:spcPts val="0"/>
-              </a:spcAft>
-              <a:buSzPts val="1100"/>
-              <a:buChar char="○"/>
-            </a:pPr>
-            <a:endParaRPr lang="fr-FR" dirty="0"/>
-          </a:p>
-          <a:p>
-            <a:pPr marL="914400" lvl="1" indent="-298450" algn="l" rtl="0">
-              <a:spcBef>
-                <a:spcPts val="0"/>
-              </a:spcBef>
-              <a:spcAft>
-                <a:spcPts val="0"/>
-              </a:spcAft>
-              <a:buSzPts val="1100"/>
-              <a:buChar char="○"/>
-            </a:pPr>
-            <a:r>
-              <a:rPr lang="en-GB" dirty="0"/>
-              <a:t>Layout : </a:t>
-            </a:r>
-            <a:r>
-              <a:rPr lang="en-GB" dirty="0" err="1"/>
-              <a:t>définit</a:t>
-            </a:r>
-            <a:r>
-              <a:rPr lang="en-GB" dirty="0"/>
-              <a:t> comment </a:t>
-            </a:r>
-            <a:r>
-              <a:rPr lang="en-GB" dirty="0" err="1"/>
-              <a:t>afficher</a:t>
-            </a:r>
-            <a:r>
-              <a:rPr lang="en-GB" dirty="0"/>
-              <a:t> </a:t>
-            </a:r>
-            <a:r>
-              <a:rPr lang="en-GB" dirty="0" err="1"/>
-              <a:t>chaque</a:t>
-            </a:r>
-            <a:r>
-              <a:rPr lang="en-GB" dirty="0"/>
-              <a:t> </a:t>
-            </a:r>
-            <a:r>
-              <a:rPr lang="en-GB" dirty="0" err="1"/>
-              <a:t>élément</a:t>
-            </a:r>
-            <a:r>
-              <a:rPr lang="en-GB" dirty="0"/>
-              <a:t>  du </a:t>
-            </a:r>
-            <a:r>
-              <a:rPr lang="en-GB" dirty="0" err="1"/>
-              <a:t>RecyclerView</a:t>
-            </a:r>
-            <a:r>
-              <a:rPr lang="en-GB" dirty="0"/>
-              <a:t>.</a:t>
-            </a:r>
-          </a:p>
-          <a:p>
-            <a:pPr marL="914400" lvl="1" indent="-298450" algn="l" rtl="0">
-              <a:spcBef>
-                <a:spcPts val="0"/>
-              </a:spcBef>
-              <a:spcAft>
-                <a:spcPts val="0"/>
-              </a:spcAft>
-              <a:buSzPts val="1100"/>
-              <a:buChar char="○"/>
-            </a:pPr>
-            <a:endParaRPr lang="en-GB" dirty="0"/>
-          </a:p>
-          <a:p>
-            <a:pPr marL="914400" lvl="1" indent="-298450" algn="l" rtl="0">
-              <a:spcBef>
-                <a:spcPts val="0"/>
-              </a:spcBef>
-              <a:spcAft>
-                <a:spcPts val="0"/>
-              </a:spcAft>
-              <a:buSzPts val="1100"/>
-              <a:buChar char="○"/>
-            </a:pPr>
-            <a:r>
-              <a:rPr lang="en-GB" dirty="0" err="1"/>
-              <a:t>LayoutManager</a:t>
-            </a:r>
-            <a:r>
-              <a:rPr lang="en-GB" dirty="0"/>
-              <a:t> : </a:t>
-            </a:r>
-            <a:r>
-              <a:rPr lang="en-GB" dirty="0" err="1"/>
-              <a:t>Définit</a:t>
-            </a:r>
-            <a:r>
-              <a:rPr lang="en-GB" dirty="0"/>
-              <a:t> </a:t>
-            </a:r>
-            <a:r>
-              <a:rPr lang="en-GB" dirty="0" err="1"/>
-              <a:t>l’arrangement</a:t>
-            </a:r>
-            <a:r>
-              <a:rPr lang="en-GB" dirty="0"/>
-              <a:t> de </a:t>
-            </a:r>
-            <a:r>
-              <a:rPr lang="en-GB" dirty="0" err="1"/>
-              <a:t>tous</a:t>
-            </a:r>
-            <a:r>
-              <a:rPr lang="en-GB" dirty="0"/>
-              <a:t> les </a:t>
-            </a:r>
-            <a:r>
-              <a:rPr lang="en-GB" dirty="0" err="1"/>
-              <a:t>éléments</a:t>
-            </a:r>
-            <a:r>
-              <a:rPr lang="en-GB" dirty="0"/>
-              <a:t> dans le </a:t>
-            </a:r>
-            <a:r>
-              <a:rPr lang="en-GB" dirty="0" err="1"/>
-              <a:t>RecyclerView</a:t>
-            </a:r>
-            <a:r>
-              <a:rPr lang="en-GB" dirty="0"/>
-              <a:t>.</a:t>
-            </a:r>
-            <a:endParaRPr lang="fr-FR" dirty="0"/>
           </a:p>
         </p:txBody>
       </p:sp>

</xml_diff>